<commit_message>
add contact details and preparation instructions to the slides
</commit_message>
<xml_diff>
--- a/01-vectors_and_subsetting/vectors_and_subsetting.pptx
+++ b/01-vectors_and_subsetting/vectors_and_subsetting.pptx
@@ -6,15 +6,17 @@
   </p:sldMasterIdLst>
   <p:sldIdLst>
     <p:sldId id="256" r:id="rId2"/>
-    <p:sldId id="265" r:id="rId3"/>
-    <p:sldId id="266" r:id="rId4"/>
-    <p:sldId id="257" r:id="rId5"/>
-    <p:sldId id="259" r:id="rId6"/>
-    <p:sldId id="263" r:id="rId7"/>
-    <p:sldId id="264" r:id="rId8"/>
-    <p:sldId id="267" r:id="rId9"/>
-    <p:sldId id="268" r:id="rId10"/>
-    <p:sldId id="269" r:id="rId11"/>
+    <p:sldId id="271" r:id="rId3"/>
+    <p:sldId id="265" r:id="rId4"/>
+    <p:sldId id="270" r:id="rId5"/>
+    <p:sldId id="266" r:id="rId6"/>
+    <p:sldId id="257" r:id="rId7"/>
+    <p:sldId id="259" r:id="rId8"/>
+    <p:sldId id="263" r:id="rId9"/>
+    <p:sldId id="264" r:id="rId10"/>
+    <p:sldId id="267" r:id="rId11"/>
+    <p:sldId id="268" r:id="rId12"/>
+    <p:sldId id="269" r:id="rId13"/>
   </p:sldIdLst>
   <p:sldSz cx="12192000" cy="6858000"/>
   <p:notesSz cx="6858000" cy="9144000"/>
@@ -4070,6 +4072,217 @@
           <p:cNvPr id="2" name="Title 1">
             <a:extLst>
               <a:ext uri="{FF2B5EF4-FFF2-40B4-BE49-F238E27FC236}">
+                <a16:creationId xmlns:a16="http://schemas.microsoft.com/office/drawing/2014/main" id="{BE593171-0718-B5EE-C8FF-319E5802D154}"/>
+              </a:ext>
+            </a:extLst>
+          </p:cNvPr>
+          <p:cNvSpPr>
+            <a:spLocks noGrp="1"/>
+          </p:cNvSpPr>
+          <p:nvPr>
+            <p:ph type="title"/>
+          </p:nvPr>
+        </p:nvSpPr>
+        <p:spPr/>
+        <p:txBody>
+          <a:bodyPr/>
+          <a:lstStyle/>
+          <a:p>
+            <a:r>
+              <a:rPr lang="en-US" dirty="0"/>
+              <a:t>RStudio Projects (.</a:t>
+            </a:r>
+            <a:r>
+              <a:rPr lang="en-US" dirty="0" err="1"/>
+              <a:t>Rproj</a:t>
+            </a:r>
+            <a:r>
+              <a:rPr lang="en-US" dirty="0"/>
+              <a:t>)</a:t>
+            </a:r>
+          </a:p>
+        </p:txBody>
+      </p:sp>
+      <p:sp>
+        <p:nvSpPr>
+          <p:cNvPr id="3" name="Text Placeholder 2">
+            <a:extLst>
+              <a:ext uri="{FF2B5EF4-FFF2-40B4-BE49-F238E27FC236}">
+                <a16:creationId xmlns:a16="http://schemas.microsoft.com/office/drawing/2014/main" id="{624648FB-778C-52DD-EC79-0A94BAF6CD6D}"/>
+              </a:ext>
+            </a:extLst>
+          </p:cNvPr>
+          <p:cNvSpPr>
+            <a:spLocks noGrp="1"/>
+          </p:cNvSpPr>
+          <p:nvPr>
+            <p:ph type="body" idx="1"/>
+          </p:nvPr>
+        </p:nvSpPr>
+        <p:spPr/>
+        <p:txBody>
+          <a:bodyPr/>
+          <a:lstStyle/>
+          <a:p>
+            <a:endParaRPr lang="en-US"/>
+          </a:p>
+        </p:txBody>
+      </p:sp>
+    </p:spTree>
+    <p:extLst>
+      <p:ext uri="{BB962C8B-B14F-4D97-AF65-F5344CB8AC3E}">
+        <p14:creationId xmlns:p14="http://schemas.microsoft.com/office/powerpoint/2010/main" val="3891912751"/>
+      </p:ext>
+    </p:extLst>
+  </p:cSld>
+  <p:clrMapOvr>
+    <a:masterClrMapping/>
+  </p:clrMapOvr>
+</p:sld>
+</file>
+
+<file path=ppt/slides/slide11.xml><?xml version="1.0" encoding="utf-8"?>
+<p:sld xmlns:a="http://schemas.openxmlformats.org/drawingml/2006/main" xmlns:r="http://schemas.openxmlformats.org/officeDocument/2006/relationships" xmlns:p="http://schemas.openxmlformats.org/presentationml/2006/main">
+  <p:cSld>
+    <p:spTree>
+      <p:nvGrpSpPr>
+        <p:cNvPr id="1" name=""/>
+        <p:cNvGrpSpPr/>
+        <p:nvPr/>
+      </p:nvGrpSpPr>
+      <p:grpSpPr>
+        <a:xfrm>
+          <a:off x="0" y="0"/>
+          <a:ext cx="0" cy="0"/>
+          <a:chOff x="0" y="0"/>
+          <a:chExt cx="0" cy="0"/>
+        </a:xfrm>
+      </p:grpSpPr>
+      <p:sp>
+        <p:nvSpPr>
+          <p:cNvPr id="2" name="Title 1">
+            <a:extLst>
+              <a:ext uri="{FF2B5EF4-FFF2-40B4-BE49-F238E27FC236}">
+                <a16:creationId xmlns:a16="http://schemas.microsoft.com/office/drawing/2014/main" id="{1200E9C6-183A-5383-6429-99111E295EAE}"/>
+              </a:ext>
+            </a:extLst>
+          </p:cNvPr>
+          <p:cNvSpPr>
+            <a:spLocks noGrp="1"/>
+          </p:cNvSpPr>
+          <p:nvPr>
+            <p:ph type="title"/>
+          </p:nvPr>
+        </p:nvSpPr>
+        <p:spPr/>
+        <p:txBody>
+          <a:bodyPr/>
+          <a:lstStyle/>
+          <a:p>
+            <a:r>
+              <a:rPr lang="en-US" dirty="0"/>
+              <a:t>RStudio Projects</a:t>
+            </a:r>
+          </a:p>
+        </p:txBody>
+      </p:sp>
+      <p:sp>
+        <p:nvSpPr>
+          <p:cNvPr id="3" name="Content Placeholder 2">
+            <a:extLst>
+              <a:ext uri="{FF2B5EF4-FFF2-40B4-BE49-F238E27FC236}">
+                <a16:creationId xmlns:a16="http://schemas.microsoft.com/office/drawing/2014/main" id="{CFA10AFA-8450-7217-4B05-C240BBBB9BE4}"/>
+              </a:ext>
+            </a:extLst>
+          </p:cNvPr>
+          <p:cNvSpPr>
+            <a:spLocks noGrp="1"/>
+          </p:cNvSpPr>
+          <p:nvPr>
+            <p:ph idx="1"/>
+          </p:nvPr>
+        </p:nvSpPr>
+        <p:spPr/>
+        <p:txBody>
+          <a:bodyPr/>
+          <a:lstStyle/>
+          <a:p>
+            <a:r>
+              <a:rPr lang="en-US" dirty="0"/>
+              <a:t>Project root folder – look for .</a:t>
+            </a:r>
+            <a:r>
+              <a:rPr lang="en-US" dirty="0" err="1"/>
+              <a:t>rproj</a:t>
+            </a:r>
+            <a:r>
+              <a:rPr lang="en-US" dirty="0"/>
+              <a:t> file</a:t>
+            </a:r>
+          </a:p>
+          <a:p>
+            <a:r>
+              <a:rPr lang="en-US" dirty="0"/>
+              <a:t>Advantages</a:t>
+            </a:r>
+          </a:p>
+          <a:p>
+            <a:pPr lvl="1"/>
+            <a:r>
+              <a:rPr lang="en-US" dirty="0"/>
+              <a:t>Relative paths: Project folder is portable and the code just works on any computer</a:t>
+            </a:r>
+          </a:p>
+          <a:p>
+            <a:pPr lvl="1"/>
+            <a:r>
+              <a:rPr lang="en-US" dirty="0"/>
+              <a:t>Ability to configure project-specific setting without modifying global settings</a:t>
+            </a:r>
+          </a:p>
+          <a:p>
+            <a:endParaRPr lang="en-US" dirty="0"/>
+          </a:p>
+          <a:p>
+            <a:endParaRPr lang="en-US" dirty="0"/>
+          </a:p>
+        </p:txBody>
+      </p:sp>
+    </p:spTree>
+    <p:extLst>
+      <p:ext uri="{BB962C8B-B14F-4D97-AF65-F5344CB8AC3E}">
+        <p14:creationId xmlns:p14="http://schemas.microsoft.com/office/powerpoint/2010/main" val="3229189987"/>
+      </p:ext>
+    </p:extLst>
+  </p:cSld>
+  <p:clrMapOvr>
+    <a:masterClrMapping/>
+  </p:clrMapOvr>
+</p:sld>
+</file>
+
+<file path=ppt/slides/slide12.xml><?xml version="1.0" encoding="utf-8"?>
+<p:sld xmlns:a="http://schemas.openxmlformats.org/drawingml/2006/main" xmlns:r="http://schemas.openxmlformats.org/officeDocument/2006/relationships" xmlns:p="http://schemas.openxmlformats.org/presentationml/2006/main">
+  <p:cSld>
+    <p:spTree>
+      <p:nvGrpSpPr>
+        <p:cNvPr id="1" name=""/>
+        <p:cNvGrpSpPr/>
+        <p:nvPr/>
+      </p:nvGrpSpPr>
+      <p:grpSpPr>
+        <a:xfrm>
+          <a:off x="0" y="0"/>
+          <a:ext cx="0" cy="0"/>
+          <a:chOff x="0" y="0"/>
+          <a:chExt cx="0" cy="0"/>
+        </a:xfrm>
+      </p:grpSpPr>
+      <p:sp>
+        <p:nvSpPr>
+          <p:cNvPr id="2" name="Title 1">
+            <a:extLst>
+              <a:ext uri="{FF2B5EF4-FFF2-40B4-BE49-F238E27FC236}">
                 <a16:creationId xmlns:a16="http://schemas.microsoft.com/office/drawing/2014/main" id="{42CA5149-436E-D4FB-651E-74A29CBC1255}"/>
               </a:ext>
             </a:extLst>
@@ -4190,7 +4403,7 @@
           <p:cNvPr id="2" name="Title 1">
             <a:extLst>
               <a:ext uri="{FF2B5EF4-FFF2-40B4-BE49-F238E27FC236}">
-                <a16:creationId xmlns:a16="http://schemas.microsoft.com/office/drawing/2014/main" id="{89B591C2-E4B0-2D46-6E1B-97AD37300BAD}"/>
+                <a16:creationId xmlns:a16="http://schemas.microsoft.com/office/drawing/2014/main" id="{B2AA843D-97E3-C59A-A1EB-9AB15A7F97A0}"/>
               </a:ext>
             </a:extLst>
           </p:cNvPr>
@@ -4208,17 +4421,140 @@
           <a:p>
             <a:r>
               <a:rPr lang="en-US" dirty="0"/>
-              <a:t>R Basics Series</a:t>
-            </a:r>
+              <a:t>Who am I?</a:t>
+            </a:r>
+          </a:p>
+        </p:txBody>
+      </p:sp>
+      <p:sp>
+        <p:nvSpPr>
+          <p:cNvPr id="3" name="Content Placeholder 2">
+            <a:extLst>
+              <a:ext uri="{FF2B5EF4-FFF2-40B4-BE49-F238E27FC236}">
+                <a16:creationId xmlns:a16="http://schemas.microsoft.com/office/drawing/2014/main" id="{84F3EC6D-1D17-A4B9-3793-E6F7CA688E47}"/>
+              </a:ext>
+            </a:extLst>
+          </p:cNvPr>
+          <p:cNvSpPr>
+            <a:spLocks noGrp="1"/>
+          </p:cNvSpPr>
+          <p:nvPr>
+            <p:ph idx="1"/>
+          </p:nvPr>
+        </p:nvSpPr>
+        <p:spPr/>
+        <p:txBody>
+          <a:bodyPr>
+            <a:normAutofit fontScale="92500" lnSpcReduction="10000"/>
+          </a:bodyPr>
+          <a:lstStyle/>
+          <a:p>
+            <a:pPr marL="0" indent="0">
+              <a:buNone/>
+            </a:pPr>
+            <a:r>
+              <a:rPr lang="en-US" b="1" dirty="0"/>
+              <a:t>Zaw Myo Tun (MBBS, PhD)</a:t>
+            </a:r>
+          </a:p>
+          <a:p>
+            <a:r>
+              <a:rPr lang="en-US" dirty="0"/>
+              <a:t>Epidemiologist and medical doctor</a:t>
+            </a:r>
+          </a:p>
+          <a:p>
+            <a:r>
+              <a:rPr lang="en-US" dirty="0"/>
+              <a:t>Research manager at a non-profit organization</a:t>
+            </a:r>
+          </a:p>
+          <a:p>
+            <a:r>
+              <a:rPr lang="en-US" dirty="0"/>
+              <a:t>I have been using R for work and for hobby projects since 2016</a:t>
+            </a:r>
+          </a:p>
+          <a:p>
+            <a:pPr marL="0" indent="0">
+              <a:buNone/>
+            </a:pPr>
+            <a:endParaRPr lang="en-US" dirty="0"/>
+          </a:p>
+          <a:p>
+            <a:pPr marL="0" indent="0">
+              <a:buNone/>
+            </a:pPr>
+            <a:r>
+              <a:rPr lang="en-US" b="1" dirty="0"/>
+              <a:t>Contacts</a:t>
+            </a:r>
+          </a:p>
+          <a:p>
+            <a:pPr marL="0" indent="0">
+              <a:buNone/>
+            </a:pPr>
+            <a:r>
+              <a:rPr lang="en-SG" dirty="0"/>
+              <a:t>Email:	zawmyotun11@gmail.com</a:t>
+            </a:r>
+            <a:endParaRPr lang="en-US" dirty="0"/>
+          </a:p>
+          <a:p>
+            <a:pPr marL="0" indent="0">
+              <a:buNone/>
+            </a:pPr>
+            <a:r>
+              <a:rPr lang="en-US" dirty="0"/>
+              <a:t>	</a:t>
+            </a:r>
+            <a:r>
+              <a:rPr lang="en-SG" dirty="0">
+                <a:hlinkClick r:id="rId2"/>
+              </a:rPr>
+              <a:t>www.linkedin.com/in/zawmyotun11</a:t>
+            </a:r>
+            <a:endParaRPr lang="en-SG" dirty="0"/>
+          </a:p>
+          <a:p>
+            <a:pPr marL="0" indent="0">
+              <a:buNone/>
+            </a:pPr>
+            <a:r>
+              <a:rPr lang="en-SG" dirty="0"/>
+              <a:t>	@</a:t>
+            </a:r>
+            <a:r>
+              <a:rPr lang="en-SG" dirty="0" err="1"/>
+              <a:t>zawmtun</a:t>
+            </a:r>
+            <a:endParaRPr lang="en-SG" dirty="0"/>
+          </a:p>
+          <a:p>
+            <a:pPr marL="0" indent="0">
+              <a:buNone/>
+            </a:pPr>
+            <a:r>
+              <a:rPr lang="en-SG" dirty="0"/>
+              <a:t>	@</a:t>
+            </a:r>
+            <a:r>
+              <a:rPr lang="en-SG" dirty="0" err="1"/>
+              <a:t>zawmtun</a:t>
+            </a:r>
+            <a:endParaRPr lang="en-SG" dirty="0"/>
+          </a:p>
+          <a:p>
+            <a:endParaRPr lang="en-US" dirty="0"/>
           </a:p>
         </p:txBody>
       </p:sp>
       <p:pic>
         <p:nvPicPr>
-          <p:cNvPr id="5" name="Picture 4">
-            <a:extLst>
-              <a:ext uri="{FF2B5EF4-FFF2-40B4-BE49-F238E27FC236}">
-                <a16:creationId xmlns:a16="http://schemas.microsoft.com/office/drawing/2014/main" id="{272ACAA0-27E5-3CBD-BAF0-88D87F37F5CA}"/>
+          <p:cNvPr id="7" name="Picture 6">
+            <a:extLst>
+              <a:ext uri="{FF2B5EF4-FFF2-40B4-BE49-F238E27FC236}">
+                <a16:creationId xmlns:a16="http://schemas.microsoft.com/office/drawing/2014/main" id="{2583591B-2432-8EDC-EF2C-8655A27A60FA}"/>
               </a:ext>
             </a:extLst>
           </p:cNvPr>
@@ -4227,66 +4563,86 @@
           </p:cNvPicPr>
           <p:nvPr/>
         </p:nvPicPr>
-        <p:blipFill rotWithShape="1">
-          <a:blip r:embed="rId2"/>
-          <a:srcRect t="32014" b="2892"/>
-          <a:stretch/>
+        <p:blipFill>
+          <a:blip r:embed="rId3"/>
+          <a:stretch>
+            <a:fillRect/>
+          </a:stretch>
         </p:blipFill>
         <p:spPr>
           <a:xfrm>
-            <a:off x="1467060" y="2193990"/>
-            <a:ext cx="9248685" cy="3608499"/>
+            <a:off x="926150" y="4802238"/>
+            <a:ext cx="432045" cy="465279"/>
           </a:xfrm>
           <a:prstGeom prst="rect">
             <a:avLst/>
           </a:prstGeom>
         </p:spPr>
       </p:pic>
-      <p:sp>
-        <p:nvSpPr>
-          <p:cNvPr id="6" name="TextBox 5">
-            <a:extLst>
-              <a:ext uri="{FF2B5EF4-FFF2-40B4-BE49-F238E27FC236}">
-                <a16:creationId xmlns:a16="http://schemas.microsoft.com/office/drawing/2014/main" id="{525240CD-8822-F8CF-0FAE-8D07E258A7AC}"/>
-              </a:ext>
-            </a:extLst>
-          </p:cNvPr>
-          <p:cNvSpPr txBox="1"/>
+      <p:pic>
+        <p:nvPicPr>
+          <p:cNvPr id="9" name="Picture 8">
+            <a:extLst>
+              <a:ext uri="{FF2B5EF4-FFF2-40B4-BE49-F238E27FC236}">
+                <a16:creationId xmlns:a16="http://schemas.microsoft.com/office/drawing/2014/main" id="{D2B4DE1B-78AC-D80E-E255-E9CD66F9CC0E}"/>
+              </a:ext>
+            </a:extLst>
+          </p:cNvPr>
+          <p:cNvPicPr>
+            <a:picLocks noChangeAspect="1"/>
+          </p:cNvPicPr>
           <p:nvPr/>
-        </p:nvSpPr>
+        </p:nvPicPr>
+        <p:blipFill>
+          <a:blip r:embed="rId4"/>
+          <a:stretch>
+            <a:fillRect/>
+          </a:stretch>
+        </p:blipFill>
         <p:spPr>
           <a:xfrm>
-            <a:off x="8037689" y="3894668"/>
-            <a:ext cx="2449689" cy="830997"/>
+            <a:off x="949396" y="5264959"/>
+            <a:ext cx="388216" cy="379589"/>
           </a:xfrm>
           <a:prstGeom prst="rect">
             <a:avLst/>
           </a:prstGeom>
-          <a:solidFill>
-            <a:schemeClr val="bg1"/>
-          </a:solidFill>
         </p:spPr>
-        <p:txBody>
-          <a:bodyPr wrap="square" rtlCol="0">
-            <a:spAutoFit/>
-          </a:bodyPr>
-          <a:lstStyle/>
-          <a:p>
-            <a:pPr algn="ctr"/>
-            <a:r>
-              <a:rPr lang="en-US" sz="2400" dirty="0">
-                <a:latin typeface="Cambria" panose="02040503050406030204" pitchFamily="18" charset="0"/>
-                <a:cs typeface="Cambay Devanagari" pitchFamily="2" charset="77"/>
-              </a:rPr>
-              <a:t>Stay tuned! More details coming.</a:t>
-            </a:r>
-          </a:p>
-        </p:txBody>
-      </p:sp>
+      </p:pic>
+      <p:pic>
+        <p:nvPicPr>
+          <p:cNvPr id="13" name="Picture 12">
+            <a:extLst>
+              <a:ext uri="{FF2B5EF4-FFF2-40B4-BE49-F238E27FC236}">
+                <a16:creationId xmlns:a16="http://schemas.microsoft.com/office/drawing/2014/main" id="{7B03CB8D-A235-AC33-5C1C-61874FD8094E}"/>
+              </a:ext>
+            </a:extLst>
+          </p:cNvPr>
+          <p:cNvPicPr>
+            <a:picLocks noChangeAspect="1"/>
+          </p:cNvPicPr>
+          <p:nvPr/>
+        </p:nvPicPr>
+        <p:blipFill>
+          <a:blip r:embed="rId5"/>
+          <a:stretch>
+            <a:fillRect/>
+          </a:stretch>
+        </p:blipFill>
+        <p:spPr>
+          <a:xfrm>
+            <a:off x="948728" y="5675857"/>
+            <a:ext cx="388216" cy="388216"/>
+          </a:xfrm>
+          <a:prstGeom prst="rect">
+            <a:avLst/>
+          </a:prstGeom>
+        </p:spPr>
+      </p:pic>
     </p:spTree>
     <p:extLst>
       <p:ext uri="{BB962C8B-B14F-4D97-AF65-F5344CB8AC3E}">
-        <p14:creationId xmlns:p14="http://schemas.microsoft.com/office/powerpoint/2010/main" val="334405693"/>
+        <p14:creationId xmlns:p14="http://schemas.microsoft.com/office/powerpoint/2010/main" val="845690565"/>
       </p:ext>
     </p:extLst>
   </p:cSld>
@@ -4318,7 +4674,7 @@
           <p:cNvPr id="2" name="Title 1">
             <a:extLst>
               <a:ext uri="{FF2B5EF4-FFF2-40B4-BE49-F238E27FC236}">
-                <a16:creationId xmlns:a16="http://schemas.microsoft.com/office/drawing/2014/main" id="{48FDFC12-5282-5B33-A82E-8A816C8905E7}"/>
+                <a16:creationId xmlns:a16="http://schemas.microsoft.com/office/drawing/2014/main" id="{89B591C2-E4B0-2D46-6E1B-97AD37300BAD}"/>
               </a:ext>
             </a:extLst>
           </p:cNvPr>
@@ -4336,45 +4692,85 @@
           <a:p>
             <a:r>
               <a:rPr lang="en-US" dirty="0"/>
-              <a:t>Vectors and </a:t>
-            </a:r>
-            <a:r>
-              <a:rPr lang="en-US" dirty="0" err="1"/>
-              <a:t>Subsetting</a:t>
-            </a:r>
-            <a:endParaRPr lang="en-US" dirty="0"/>
-          </a:p>
-        </p:txBody>
-      </p:sp>
-      <p:sp>
-        <p:nvSpPr>
-          <p:cNvPr id="3" name="Text Placeholder 2">
-            <a:extLst>
-              <a:ext uri="{FF2B5EF4-FFF2-40B4-BE49-F238E27FC236}">
-                <a16:creationId xmlns:a16="http://schemas.microsoft.com/office/drawing/2014/main" id="{35518ADE-072B-2F6C-EDC3-603F3218FB62}"/>
-              </a:ext>
-            </a:extLst>
-          </p:cNvPr>
-          <p:cNvSpPr>
-            <a:spLocks noGrp="1"/>
-          </p:cNvSpPr>
-          <p:nvPr>
-            <p:ph type="body" idx="1"/>
-          </p:nvPr>
-        </p:nvSpPr>
-        <p:spPr/>
-        <p:txBody>
-          <a:bodyPr/>
-          <a:lstStyle/>
-          <a:p>
-            <a:endParaRPr lang="en-US"/>
+              <a:t>R Basics Series</a:t>
+            </a:r>
+          </a:p>
+        </p:txBody>
+      </p:sp>
+      <p:pic>
+        <p:nvPicPr>
+          <p:cNvPr id="5" name="Picture 4">
+            <a:extLst>
+              <a:ext uri="{FF2B5EF4-FFF2-40B4-BE49-F238E27FC236}">
+                <a16:creationId xmlns:a16="http://schemas.microsoft.com/office/drawing/2014/main" id="{272ACAA0-27E5-3CBD-BAF0-88D87F37F5CA}"/>
+              </a:ext>
+            </a:extLst>
+          </p:cNvPr>
+          <p:cNvPicPr>
+            <a:picLocks noChangeAspect="1"/>
+          </p:cNvPicPr>
+          <p:nvPr/>
+        </p:nvPicPr>
+        <p:blipFill rotWithShape="1">
+          <a:blip r:embed="rId2"/>
+          <a:srcRect t="32014" b="2892"/>
+          <a:stretch/>
+        </p:blipFill>
+        <p:spPr>
+          <a:xfrm>
+            <a:off x="1467060" y="2193990"/>
+            <a:ext cx="9248685" cy="3608499"/>
+          </a:xfrm>
+          <a:prstGeom prst="rect">
+            <a:avLst/>
+          </a:prstGeom>
+        </p:spPr>
+      </p:pic>
+      <p:sp>
+        <p:nvSpPr>
+          <p:cNvPr id="6" name="TextBox 5">
+            <a:extLst>
+              <a:ext uri="{FF2B5EF4-FFF2-40B4-BE49-F238E27FC236}">
+                <a16:creationId xmlns:a16="http://schemas.microsoft.com/office/drawing/2014/main" id="{525240CD-8822-F8CF-0FAE-8D07E258A7AC}"/>
+              </a:ext>
+            </a:extLst>
+          </p:cNvPr>
+          <p:cNvSpPr txBox="1"/>
+          <p:nvPr/>
+        </p:nvSpPr>
+        <p:spPr>
+          <a:xfrm>
+            <a:off x="8037689" y="3894668"/>
+            <a:ext cx="2449689" cy="830997"/>
+          </a:xfrm>
+          <a:prstGeom prst="rect">
+            <a:avLst/>
+          </a:prstGeom>
+          <a:solidFill>
+            <a:schemeClr val="bg1"/>
+          </a:solidFill>
+        </p:spPr>
+        <p:txBody>
+          <a:bodyPr wrap="square" rtlCol="0">
+            <a:spAutoFit/>
+          </a:bodyPr>
+          <a:lstStyle/>
+          <a:p>
+            <a:pPr algn="ctr"/>
+            <a:r>
+              <a:rPr lang="en-US" sz="2400" dirty="0">
+                <a:latin typeface="Cambria" panose="02040503050406030204" pitchFamily="18" charset="0"/>
+                <a:cs typeface="Cambay Devanagari" pitchFamily="2" charset="77"/>
+              </a:rPr>
+              <a:t>Stay tuned! More details coming.</a:t>
+            </a:r>
           </a:p>
         </p:txBody>
       </p:sp>
     </p:spTree>
     <p:extLst>
       <p:ext uri="{BB962C8B-B14F-4D97-AF65-F5344CB8AC3E}">
-        <p14:creationId xmlns:p14="http://schemas.microsoft.com/office/powerpoint/2010/main" val="3054975504"/>
+        <p14:creationId xmlns:p14="http://schemas.microsoft.com/office/powerpoint/2010/main" val="334405693"/>
       </p:ext>
     </p:extLst>
   </p:cSld>
@@ -4406,7 +4802,7 @@
           <p:cNvPr id="2" name="Title 1">
             <a:extLst>
               <a:ext uri="{FF2B5EF4-FFF2-40B4-BE49-F238E27FC236}">
-                <a16:creationId xmlns:a16="http://schemas.microsoft.com/office/drawing/2014/main" id="{38F0976D-9BB7-F9BF-45AA-FADA690359F4}"/>
+                <a16:creationId xmlns:a16="http://schemas.microsoft.com/office/drawing/2014/main" id="{0F87143B-F8E0-15D4-85CC-4738047D8A26}"/>
               </a:ext>
             </a:extLst>
           </p:cNvPr>
@@ -4417,174 +4813,73 @@
             <p:ph type="title"/>
           </p:nvPr>
         </p:nvSpPr>
-        <p:spPr>
-          <a:xfrm>
-            <a:off x="838200" y="365125"/>
-            <a:ext cx="9152752" cy="995221"/>
-          </a:xfrm>
-        </p:spPr>
+        <p:spPr/>
         <p:txBody>
           <a:bodyPr/>
           <a:lstStyle/>
           <a:p>
-            <a:pPr marL="0" lvl="0" indent="0">
+            <a:r>
+              <a:rPr lang="en-US" dirty="0"/>
+              <a:t>To follow along the exercises</a:t>
+            </a:r>
+          </a:p>
+        </p:txBody>
+      </p:sp>
+      <p:sp>
+        <p:nvSpPr>
+          <p:cNvPr id="3" name="Content Placeholder 2">
+            <a:extLst>
+              <a:ext uri="{FF2B5EF4-FFF2-40B4-BE49-F238E27FC236}">
+                <a16:creationId xmlns:a16="http://schemas.microsoft.com/office/drawing/2014/main" id="{D5A98B86-ADA7-4F99-FB93-A3B7CD7F0E47}"/>
+              </a:ext>
+            </a:extLst>
+          </p:cNvPr>
+          <p:cNvSpPr>
+            <a:spLocks noGrp="1"/>
+          </p:cNvSpPr>
+          <p:nvPr>
+            <p:ph idx="1"/>
+          </p:nvPr>
+        </p:nvSpPr>
+        <p:spPr/>
+        <p:txBody>
+          <a:bodyPr/>
+          <a:lstStyle/>
+          <a:p>
+            <a:r>
+              <a:rPr lang="en-US" dirty="0"/>
+              <a:t>Have R and RStudio installed in your computer</a:t>
+            </a:r>
+          </a:p>
+          <a:p>
+            <a:r>
+              <a:rPr lang="en-US" dirty="0"/>
+              <a:t>Downloaded and extracted the GitHub repository for this session</a:t>
+            </a:r>
+          </a:p>
+          <a:p>
+            <a:pPr marL="0" indent="0">
               <a:buNone/>
             </a:pPr>
             <a:r>
-              <a:rPr dirty="0"/>
-              <a:t>Vectors and data types</a:t>
-            </a:r>
-          </a:p>
-        </p:txBody>
-      </p:sp>
-      <p:sp>
-        <p:nvSpPr>
-          <p:cNvPr id="3" name="Content Placeholder 2">
-            <a:extLst>
-              <a:ext uri="{FF2B5EF4-FFF2-40B4-BE49-F238E27FC236}">
-                <a16:creationId xmlns:a16="http://schemas.microsoft.com/office/drawing/2014/main" id="{49752B89-85F3-5DE8-AB98-7BFB09D2A4DD}"/>
-              </a:ext>
-            </a:extLst>
-          </p:cNvPr>
-          <p:cNvSpPr>
-            <a:spLocks noGrp="1"/>
-          </p:cNvSpPr>
-          <p:nvPr>
-            <p:ph idx="1"/>
-          </p:nvPr>
-        </p:nvSpPr>
-        <p:spPr/>
-        <p:txBody>
-          <a:bodyPr/>
-          <a:lstStyle/>
-          <a:p>
-            <a:pPr lvl="0"/>
-            <a:r>
-              <a:rPr dirty="0"/>
-              <a:t>Basic data type in R</a:t>
-            </a:r>
-          </a:p>
-          <a:p>
-            <a:pPr lvl="0"/>
-            <a:r>
-              <a:rPr dirty="0"/>
-              <a:t>Types</a:t>
-            </a:r>
-          </a:p>
-          <a:p>
-            <a:pPr lvl="1"/>
-            <a:r>
-              <a:rPr dirty="0"/>
-              <a:t>Logical: </a:t>
-            </a:r>
-            <a:r>
-              <a:rPr dirty="0">
-                <a:solidFill>
-                  <a:schemeClr val="accent1"/>
-                </a:solidFill>
-                <a:latin typeface="Fira Code Retina" pitchFamily="49" charset="0"/>
-                <a:ea typeface="Fira Code Retina" pitchFamily="49" charset="0"/>
-                <a:cs typeface="Fira Code Retina" pitchFamily="49" charset="0"/>
+              <a:rPr lang="en-US" dirty="0">
+                <a:hlinkClick r:id="rId2"/>
               </a:rPr>
-              <a:t>TRUE</a:t>
-            </a:r>
-            <a:r>
-              <a:rPr dirty="0"/>
-              <a:t> or </a:t>
-            </a:r>
-            <a:r>
-              <a:rPr dirty="0">
-                <a:solidFill>
-                  <a:schemeClr val="accent1"/>
-                </a:solidFill>
-                <a:latin typeface="Fira Code Retina" pitchFamily="49" charset="0"/>
-                <a:ea typeface="Fira Code Retina" pitchFamily="49" charset="0"/>
-                <a:cs typeface="Fira Code Retina" pitchFamily="49" charset="0"/>
-              </a:rPr>
-              <a:t>FASLE</a:t>
-            </a:r>
-          </a:p>
-          <a:p>
-            <a:pPr lvl="1"/>
-            <a:r>
-              <a:rPr dirty="0"/>
-              <a:t>Numeric: Either integer or double (real)</a:t>
-            </a:r>
-          </a:p>
-          <a:p>
-            <a:pPr lvl="1"/>
-            <a:r>
-              <a:rPr dirty="0"/>
-              <a:t>Character (add double quote </a:t>
-            </a:r>
-            <a:r>
-              <a:rPr dirty="0">
-                <a:solidFill>
-                  <a:schemeClr val="accent1"/>
-                </a:solidFill>
-                <a:latin typeface="Fira Code Retina" pitchFamily="49" charset="0"/>
-                <a:ea typeface="Fira Code Retina" pitchFamily="49" charset="0"/>
-                <a:cs typeface="Fira Code Retina" pitchFamily="49" charset="0"/>
-              </a:rPr>
-              <a:t>"dog"</a:t>
-            </a:r>
-            <a:r>
-              <a:rPr lang="en-US" dirty="0">
-                <a:solidFill>
-                  <a:schemeClr val="accent1"/>
-                </a:solidFill>
-              </a:rPr>
+              <a:t>https://github.com/zawmtun/MRUG-R-Basics</a:t>
+            </a:r>
+            <a:r>
+              <a:rPr lang="en-US" dirty="0"/>
               <a:t> </a:t>
             </a:r>
-            <a:r>
-              <a:rPr lang="en-US" dirty="0"/>
-              <a:t>(</a:t>
-            </a:r>
-            <a:r>
-              <a:rPr dirty="0"/>
-              <a:t>more common) or single quote </a:t>
-            </a:r>
-            <a:r>
-              <a:rPr dirty="0">
-                <a:solidFill>
-                  <a:schemeClr val="accent1"/>
-                </a:solidFill>
-                <a:latin typeface="Fira Code Retina" pitchFamily="49" charset="0"/>
-                <a:ea typeface="Fira Code Retina" pitchFamily="49" charset="0"/>
-                <a:cs typeface="Fira Code Retina" pitchFamily="49" charset="0"/>
-              </a:rPr>
-              <a:t>'dog'</a:t>
-            </a:r>
-            <a:r>
-              <a:rPr dirty="0">
-                <a:latin typeface="Courier"/>
-              </a:rPr>
-              <a:t>)</a:t>
-            </a:r>
-          </a:p>
-          <a:p>
-            <a:pPr lvl="1"/>
-            <a:r>
-              <a:rPr dirty="0"/>
-              <a:t>Complex</a:t>
-            </a:r>
-          </a:p>
-          <a:p>
-            <a:pPr lvl="1"/>
-            <a:r>
-              <a:rPr dirty="0"/>
-              <a:t>Raw</a:t>
-            </a:r>
-          </a:p>
-          <a:p>
-            <a:pPr marL="0" lvl="0" indent="0">
-              <a:buNone/>
-            </a:pPr>
-            <a:endParaRPr dirty="0"/>
           </a:p>
         </p:txBody>
       </p:sp>
     </p:spTree>
+    <p:extLst>
+      <p:ext uri="{BB962C8B-B14F-4D97-AF65-F5344CB8AC3E}">
+        <p14:creationId xmlns:p14="http://schemas.microsoft.com/office/powerpoint/2010/main" val="3461969237"/>
+      </p:ext>
+    </p:extLst>
   </p:cSld>
   <p:clrMapOvr>
     <a:masterClrMapping/>
@@ -4614,7 +4909,7 @@
           <p:cNvPr id="2" name="Title 1">
             <a:extLst>
               <a:ext uri="{FF2B5EF4-FFF2-40B4-BE49-F238E27FC236}">
-                <a16:creationId xmlns:a16="http://schemas.microsoft.com/office/drawing/2014/main" id="{DE4178AD-BE9F-2932-FDDF-C013D6CC21FB}"/>
+                <a16:creationId xmlns:a16="http://schemas.microsoft.com/office/drawing/2014/main" id="{48FDFC12-5282-5B33-A82E-8A816C8905E7}"/>
               </a:ext>
             </a:extLst>
           </p:cNvPr>
@@ -4631,8 +4926,12 @@
           <a:lstStyle/>
           <a:p>
             <a:r>
-              <a:rPr lang="en-SG" dirty="0"/>
-              <a:t>Vectors and data types</a:t>
+              <a:rPr lang="en-US" dirty="0"/>
+              <a:t>Vectors and </a:t>
+            </a:r>
+            <a:r>
+              <a:rPr lang="en-US" dirty="0" err="1"/>
+              <a:t>Subsetting</a:t>
             </a:r>
             <a:endParaRPr lang="en-US" dirty="0"/>
           </a:p>
@@ -4640,300 +4939,33 @@
       </p:sp>
       <p:sp>
         <p:nvSpPr>
-          <p:cNvPr id="3" name="Content Placeholder 2">
-            <a:extLst>
-              <a:ext uri="{FF2B5EF4-FFF2-40B4-BE49-F238E27FC236}">
-                <a16:creationId xmlns:a16="http://schemas.microsoft.com/office/drawing/2014/main" id="{5627D125-AFE7-7663-A2B9-BA3A0ADEE149}"/>
-              </a:ext>
-            </a:extLst>
-          </p:cNvPr>
-          <p:cNvSpPr>
-            <a:spLocks noGrp="1"/>
-          </p:cNvSpPr>
-          <p:nvPr>
-            <p:ph idx="1"/>
-          </p:nvPr>
-        </p:nvSpPr>
-        <p:spPr>
-          <a:xfrm>
-            <a:off x="838200" y="1825624"/>
-            <a:ext cx="10515600" cy="4552597"/>
-          </a:xfrm>
-        </p:spPr>
-        <p:txBody>
-          <a:bodyPr>
-            <a:normAutofit fontScale="92500" lnSpcReduction="20000"/>
-          </a:bodyPr>
-          <a:lstStyle/>
-          <a:p>
-            <a:r>
-              <a:rPr lang="en-US" dirty="0"/>
-              <a:t>Functions for vectors</a:t>
-            </a:r>
-          </a:p>
-          <a:p>
-            <a:pPr lvl="1"/>
-            <a:r>
-              <a:rPr lang="en-US" dirty="0"/>
-              <a:t>Attributes</a:t>
-            </a:r>
-          </a:p>
-          <a:p>
-            <a:pPr lvl="2"/>
-            <a:r>
-              <a:rPr lang="en-US" dirty="0">
-                <a:solidFill>
-                  <a:schemeClr val="accent1"/>
-                </a:solidFill>
-                <a:latin typeface="Fira Code Retina" pitchFamily="49" charset="0"/>
-                <a:ea typeface="Fira Code Retina" pitchFamily="49" charset="0"/>
-                <a:cs typeface="Fira Code Retina" pitchFamily="49" charset="0"/>
-              </a:rPr>
-              <a:t>length(), class(), str(), </a:t>
-            </a:r>
-            <a:r>
-              <a:rPr lang="en-US" dirty="0" err="1">
-                <a:solidFill>
-                  <a:schemeClr val="accent1"/>
-                </a:solidFill>
-                <a:latin typeface="Fira Code Retina" pitchFamily="49" charset="0"/>
-                <a:ea typeface="Fira Code Retina" pitchFamily="49" charset="0"/>
-                <a:cs typeface="Fira Code Retina" pitchFamily="49" charset="0"/>
-              </a:rPr>
-              <a:t>typeof</a:t>
-            </a:r>
-            <a:r>
-              <a:rPr lang="en-US" dirty="0">
-                <a:solidFill>
-                  <a:schemeClr val="accent1"/>
-                </a:solidFill>
-                <a:latin typeface="Fira Code Retina" pitchFamily="49" charset="0"/>
-                <a:ea typeface="Fira Code Retina" pitchFamily="49" charset="0"/>
-                <a:cs typeface="Fira Code Retina" pitchFamily="49" charset="0"/>
-              </a:rPr>
-              <a:t>()</a:t>
-            </a:r>
-          </a:p>
-          <a:p>
-            <a:pPr lvl="1"/>
-            <a:r>
-              <a:rPr lang="en-US" dirty="0">
-                <a:ea typeface="Fira Code Retina" pitchFamily="49" charset="0"/>
-                <a:cs typeface="Cambay Devanagari" pitchFamily="2" charset="77"/>
-              </a:rPr>
-              <a:t>Add more elements using </a:t>
-            </a:r>
-            <a:r>
-              <a:rPr lang="en-US" dirty="0">
-                <a:solidFill>
-                  <a:schemeClr val="accent1"/>
-                </a:solidFill>
-                <a:latin typeface="Fira Code Retina" pitchFamily="49" charset="0"/>
-                <a:ea typeface="Fira Code Retina" pitchFamily="49" charset="0"/>
-                <a:cs typeface="Fira Code Retina" pitchFamily="49" charset="0"/>
-              </a:rPr>
-              <a:t>c()</a:t>
-            </a:r>
-          </a:p>
-          <a:p>
-            <a:pPr lvl="1"/>
-            <a:r>
-              <a:rPr lang="en-US" dirty="0">
-                <a:ea typeface="Fira Code Retina" pitchFamily="49" charset="0"/>
-              </a:rPr>
-              <a:t>Manually convert variable types</a:t>
-            </a:r>
-          </a:p>
-          <a:p>
-            <a:pPr lvl="2">
-              <a:lnSpc>
-                <a:spcPct val="110000"/>
-              </a:lnSpc>
-            </a:pPr>
-            <a:r>
-              <a:rPr lang="en-US" dirty="0" err="1">
-                <a:solidFill>
-                  <a:schemeClr val="accent1"/>
-                </a:solidFill>
-                <a:latin typeface="Fira Code Retina" pitchFamily="49" charset="0"/>
-                <a:ea typeface="Fira Code Retina" pitchFamily="49" charset="0"/>
-                <a:cs typeface="Fira Code Retina" pitchFamily="49" charset="0"/>
-              </a:rPr>
-              <a:t>as.logical</a:t>
-            </a:r>
-            <a:r>
-              <a:rPr lang="en-US" dirty="0">
-                <a:solidFill>
-                  <a:schemeClr val="accent1"/>
-                </a:solidFill>
-                <a:latin typeface="Fira Code Retina" pitchFamily="49" charset="0"/>
-                <a:ea typeface="Fira Code Retina" pitchFamily="49" charset="0"/>
-                <a:cs typeface="Fira Code Retina" pitchFamily="49" charset="0"/>
-              </a:rPr>
-              <a:t>(), </a:t>
-            </a:r>
-            <a:r>
-              <a:rPr lang="en-US" dirty="0" err="1">
-                <a:solidFill>
-                  <a:schemeClr val="accent1"/>
-                </a:solidFill>
-                <a:latin typeface="Fira Code Retina" pitchFamily="49" charset="0"/>
-                <a:ea typeface="Fira Code Retina" pitchFamily="49" charset="0"/>
-                <a:cs typeface="Fira Code Retina" pitchFamily="49" charset="0"/>
-              </a:rPr>
-              <a:t>as.numeric</a:t>
-            </a:r>
-            <a:r>
-              <a:rPr lang="en-US" dirty="0">
-                <a:solidFill>
-                  <a:schemeClr val="accent1"/>
-                </a:solidFill>
-                <a:latin typeface="Fira Code Retina" pitchFamily="49" charset="0"/>
-                <a:ea typeface="Fira Code Retina" pitchFamily="49" charset="0"/>
-                <a:cs typeface="Fira Code Retina" pitchFamily="49" charset="0"/>
-              </a:rPr>
-              <a:t>(), </a:t>
-            </a:r>
-            <a:r>
-              <a:rPr lang="en-US" dirty="0" err="1">
-                <a:solidFill>
-                  <a:schemeClr val="accent1"/>
-                </a:solidFill>
-                <a:latin typeface="Fira Code Retina" pitchFamily="49" charset="0"/>
-                <a:ea typeface="Fira Code Retina" pitchFamily="49" charset="0"/>
-                <a:cs typeface="Fira Code Retina" pitchFamily="49" charset="0"/>
-              </a:rPr>
-              <a:t>as.double</a:t>
-            </a:r>
-            <a:r>
-              <a:rPr lang="en-US" dirty="0">
-                <a:solidFill>
-                  <a:schemeClr val="accent1"/>
-                </a:solidFill>
-                <a:latin typeface="Fira Code Retina" pitchFamily="49" charset="0"/>
-                <a:ea typeface="Fira Code Retina" pitchFamily="49" charset="0"/>
-                <a:cs typeface="Fira Code Retina" pitchFamily="49" charset="0"/>
-              </a:rPr>
-              <a:t>(), </a:t>
-            </a:r>
-            <a:r>
-              <a:rPr lang="en-US" dirty="0" err="1">
-                <a:solidFill>
-                  <a:schemeClr val="accent1"/>
-                </a:solidFill>
-                <a:latin typeface="Fira Code Retina" pitchFamily="49" charset="0"/>
-                <a:ea typeface="Fira Code Retina" pitchFamily="49" charset="0"/>
-                <a:cs typeface="Fira Code Retina" pitchFamily="49" charset="0"/>
-              </a:rPr>
-              <a:t>as.integer</a:t>
-            </a:r>
-            <a:r>
-              <a:rPr lang="en-US" dirty="0">
-                <a:solidFill>
-                  <a:schemeClr val="accent1"/>
-                </a:solidFill>
-                <a:latin typeface="Fira Code Retina" pitchFamily="49" charset="0"/>
-                <a:ea typeface="Fira Code Retina" pitchFamily="49" charset="0"/>
-                <a:cs typeface="Fira Code Retina" pitchFamily="49" charset="0"/>
-              </a:rPr>
-              <a:t>(), </a:t>
-            </a:r>
-            <a:r>
-              <a:rPr lang="en-US" dirty="0" err="1">
-                <a:solidFill>
-                  <a:schemeClr val="accent1"/>
-                </a:solidFill>
-                <a:latin typeface="Fira Code Retina" pitchFamily="49" charset="0"/>
-                <a:ea typeface="Fira Code Retina" pitchFamily="49" charset="0"/>
-                <a:cs typeface="Fira Code Retina" pitchFamily="49" charset="0"/>
-              </a:rPr>
-              <a:t>as.character</a:t>
-            </a:r>
-            <a:r>
-              <a:rPr lang="en-US" dirty="0">
-                <a:solidFill>
-                  <a:schemeClr val="accent1"/>
-                </a:solidFill>
-                <a:latin typeface="Fira Code Retina" pitchFamily="49" charset="0"/>
-                <a:ea typeface="Fira Code Retina" pitchFamily="49" charset="0"/>
-                <a:cs typeface="Fira Code Retina" pitchFamily="49" charset="0"/>
-              </a:rPr>
-              <a:t>()</a:t>
-            </a:r>
-          </a:p>
-          <a:p>
-            <a:pPr lvl="1"/>
-            <a:endParaRPr lang="en-US" dirty="0">
-              <a:latin typeface="Fira Code Retina" pitchFamily="49" charset="0"/>
-              <a:ea typeface="Fira Code Retina" pitchFamily="49" charset="0"/>
-              <a:cs typeface="Fira Code Retina" pitchFamily="49" charset="0"/>
-            </a:endParaRPr>
-          </a:p>
-          <a:p>
-            <a:r>
-              <a:rPr lang="en-US" dirty="0">
-                <a:ea typeface="Fira Code Retina" pitchFamily="49" charset="0"/>
-                <a:cs typeface="Fira Code Retina" pitchFamily="49" charset="0"/>
-              </a:rPr>
-              <a:t>Other data structures</a:t>
-            </a:r>
-          </a:p>
-          <a:p>
-            <a:pPr lvl="1"/>
-            <a:r>
-              <a:rPr lang="en-US" dirty="0">
-                <a:ea typeface="Fira Code Retina" pitchFamily="49" charset="0"/>
-                <a:cs typeface="Fira Code Retina" pitchFamily="49" charset="0"/>
-              </a:rPr>
-              <a:t>Lists</a:t>
-            </a:r>
-          </a:p>
-          <a:p>
-            <a:pPr lvl="1"/>
-            <a:r>
-              <a:rPr lang="en-US" dirty="0">
-                <a:ea typeface="Fira Code Retina" pitchFamily="49" charset="0"/>
-                <a:cs typeface="Fira Code Retina" pitchFamily="49" charset="0"/>
-              </a:rPr>
-              <a:t>Matrices</a:t>
-            </a:r>
-          </a:p>
-          <a:p>
-            <a:pPr lvl="1"/>
-            <a:r>
-              <a:rPr lang="en-US" dirty="0">
-                <a:ea typeface="Fira Code Retina" pitchFamily="49" charset="0"/>
-                <a:cs typeface="Fira Code Retina" pitchFamily="49" charset="0"/>
-              </a:rPr>
-              <a:t>Data frames</a:t>
-            </a:r>
-          </a:p>
-          <a:p>
-            <a:pPr lvl="1"/>
-            <a:r>
-              <a:rPr lang="en-US" dirty="0">
-                <a:ea typeface="Fira Code Retina" pitchFamily="49" charset="0"/>
-                <a:cs typeface="Fira Code Retina" pitchFamily="49" charset="0"/>
-              </a:rPr>
-              <a:t>Factors</a:t>
-            </a:r>
-          </a:p>
-          <a:p>
-            <a:pPr lvl="1"/>
-            <a:r>
-              <a:rPr lang="en-US" dirty="0">
-                <a:ea typeface="Fira Code Retina" pitchFamily="49" charset="0"/>
-                <a:cs typeface="Fira Code Retina" pitchFamily="49" charset="0"/>
-              </a:rPr>
-              <a:t>Arrays</a:t>
-            </a:r>
+          <p:cNvPr id="3" name="Text Placeholder 2">
+            <a:extLst>
+              <a:ext uri="{FF2B5EF4-FFF2-40B4-BE49-F238E27FC236}">
+                <a16:creationId xmlns:a16="http://schemas.microsoft.com/office/drawing/2014/main" id="{35518ADE-072B-2F6C-EDC3-603F3218FB62}"/>
+              </a:ext>
+            </a:extLst>
+          </p:cNvPr>
+          <p:cNvSpPr>
+            <a:spLocks noGrp="1"/>
+          </p:cNvSpPr>
+          <p:nvPr>
+            <p:ph type="body" idx="1"/>
+          </p:nvPr>
+        </p:nvSpPr>
+        <p:spPr/>
+        <p:txBody>
+          <a:bodyPr/>
+          <a:lstStyle/>
+          <a:p>
+            <a:endParaRPr lang="en-US"/>
           </a:p>
         </p:txBody>
       </p:sp>
     </p:spTree>
     <p:extLst>
       <p:ext uri="{BB962C8B-B14F-4D97-AF65-F5344CB8AC3E}">
-        <p14:creationId xmlns:p14="http://schemas.microsoft.com/office/powerpoint/2010/main" val="287049191"/>
+        <p14:creationId xmlns:p14="http://schemas.microsoft.com/office/powerpoint/2010/main" val="3054975504"/>
       </p:ext>
     </p:extLst>
   </p:cSld>
@@ -4965,7 +4997,7 @@
           <p:cNvPr id="2" name="Title 1">
             <a:extLst>
               <a:ext uri="{FF2B5EF4-FFF2-40B4-BE49-F238E27FC236}">
-                <a16:creationId xmlns:a16="http://schemas.microsoft.com/office/drawing/2014/main" id="{E90CCBB2-BDA4-161D-FC5F-5E57177B4C84}"/>
+                <a16:creationId xmlns:a16="http://schemas.microsoft.com/office/drawing/2014/main" id="{38F0976D-9BB7-F9BF-45AA-FADA690359F4}"/>
               </a:ext>
             </a:extLst>
           </p:cNvPr>
@@ -4976,91 +5008,83 @@
             <p:ph type="title"/>
           </p:nvPr>
         </p:nvSpPr>
+        <p:spPr>
+          <a:xfrm>
+            <a:off x="838200" y="365125"/>
+            <a:ext cx="9152752" cy="995221"/>
+          </a:xfrm>
+        </p:spPr>
+        <p:txBody>
+          <a:bodyPr/>
+          <a:lstStyle/>
+          <a:p>
+            <a:pPr marL="0" lvl="0" indent="0">
+              <a:buNone/>
+            </a:pPr>
+            <a:r>
+              <a:rPr dirty="0"/>
+              <a:t>Vectors and data types</a:t>
+            </a:r>
+          </a:p>
+        </p:txBody>
+      </p:sp>
+      <p:sp>
+        <p:nvSpPr>
+          <p:cNvPr id="3" name="Content Placeholder 2">
+            <a:extLst>
+              <a:ext uri="{FF2B5EF4-FFF2-40B4-BE49-F238E27FC236}">
+                <a16:creationId xmlns:a16="http://schemas.microsoft.com/office/drawing/2014/main" id="{49752B89-85F3-5DE8-AB98-7BFB09D2A4DD}"/>
+              </a:ext>
+            </a:extLst>
+          </p:cNvPr>
+          <p:cNvSpPr>
+            <a:spLocks noGrp="1"/>
+          </p:cNvSpPr>
+          <p:nvPr>
+            <p:ph idx="1"/>
+          </p:nvPr>
+        </p:nvSpPr>
         <p:spPr/>
         <p:txBody>
           <a:bodyPr/>
           <a:lstStyle/>
           <a:p>
-            <a:r>
-              <a:rPr lang="en-US" dirty="0" err="1"/>
-              <a:t>Subsetting</a:t>
-            </a:r>
-            <a:r>
-              <a:rPr lang="en-US" dirty="0"/>
-              <a:t> vectors</a:t>
-            </a:r>
-          </a:p>
-        </p:txBody>
-      </p:sp>
-      <p:sp>
-        <p:nvSpPr>
-          <p:cNvPr id="3" name="Content Placeholder 2">
-            <a:extLst>
-              <a:ext uri="{FF2B5EF4-FFF2-40B4-BE49-F238E27FC236}">
-                <a16:creationId xmlns:a16="http://schemas.microsoft.com/office/drawing/2014/main" id="{7024D2EB-95B2-A304-6CE0-6F7B02FA3E0E}"/>
-              </a:ext>
-            </a:extLst>
-          </p:cNvPr>
-          <p:cNvSpPr>
-            <a:spLocks noGrp="1"/>
-          </p:cNvSpPr>
-          <p:nvPr>
-            <p:ph idx="1"/>
-          </p:nvPr>
-        </p:nvSpPr>
-        <p:spPr/>
-        <p:txBody>
-          <a:bodyPr/>
-          <a:lstStyle/>
-          <a:p>
-            <a:r>
-              <a:rPr lang="en-US" dirty="0"/>
-              <a:t>It means extracting elements and use them create a new vector</a:t>
-            </a:r>
-          </a:p>
-          <a:p>
-            <a:r>
-              <a:rPr lang="en-US" dirty="0"/>
-              <a:t>Two ways to subset a vector</a:t>
-            </a:r>
-          </a:p>
-          <a:p>
-            <a:endParaRPr lang="en-US" dirty="0"/>
-          </a:p>
-          <a:p>
-            <a:pPr marL="457200" indent="-457200">
-              <a:buFont typeface="+mj-lt"/>
-              <a:buAutoNum type="arabicPeriod"/>
-            </a:pPr>
-            <a:r>
-              <a:rPr lang="en-US" dirty="0"/>
-              <a:t>Use indices: sequence of elements in a vector</a:t>
+            <a:pPr lvl="0"/>
+            <a:r>
+              <a:rPr dirty="0"/>
+              <a:t>Basic data type in R</a:t>
+            </a:r>
+          </a:p>
+          <a:p>
+            <a:pPr lvl="0"/>
+            <a:r>
+              <a:rPr dirty="0"/>
+              <a:t>Types</a:t>
             </a:r>
           </a:p>
           <a:p>
             <a:pPr lvl="1"/>
             <a:r>
-              <a:rPr lang="en-US" dirty="0"/>
-              <a:t>Indices always start at 1</a:t>
-            </a:r>
-          </a:p>
-          <a:p>
-            <a:pPr marL="0" indent="0">
-              <a:buNone/>
-            </a:pPr>
-            <a:r>
-              <a:rPr lang="en-SG" sz="1800" dirty="0">
-                <a:solidFill>
-                  <a:schemeClr val="tx1"/>
+              <a:rPr dirty="0"/>
+              <a:t>Logical: </a:t>
+            </a:r>
+            <a:r>
+              <a:rPr dirty="0">
+                <a:solidFill>
+                  <a:schemeClr val="accent1"/>
                 </a:solidFill>
                 <a:latin typeface="Fira Code Retina" pitchFamily="49" charset="0"/>
                 <a:ea typeface="Fira Code Retina" pitchFamily="49" charset="0"/>
                 <a:cs typeface="Fira Code Retina" pitchFamily="49" charset="0"/>
               </a:rPr>
-              <a:t>	</a:t>
-            </a:r>
-            <a:r>
-              <a:rPr lang="en-SG" sz="1800" dirty="0">
+              <a:t>TRUE</a:t>
+            </a:r>
+            <a:r>
+              <a:rPr dirty="0"/>
+              <a:t> or </a:t>
+            </a:r>
+            <a:r>
+              <a:rPr dirty="0">
                 <a:solidFill>
                   <a:schemeClr val="accent1"/>
                 </a:solidFill>
@@ -5068,10 +5092,24 @@
                 <a:ea typeface="Fira Code Retina" pitchFamily="49" charset="0"/>
                 <a:cs typeface="Fira Code Retina" pitchFamily="49" charset="0"/>
               </a:rPr>
-              <a:t>animals &lt;- </a:t>
-            </a:r>
-            <a:r>
-              <a:rPr lang="en-SG" sz="1800" b="1" dirty="0">
+              <a:t>FASLE</a:t>
+            </a:r>
+          </a:p>
+          <a:p>
+            <a:pPr lvl="1"/>
+            <a:r>
+              <a:rPr dirty="0"/>
+              <a:t>Numeric: Either integer or double (real)</a:t>
+            </a:r>
+          </a:p>
+          <a:p>
+            <a:pPr lvl="1"/>
+            <a:r>
+              <a:rPr dirty="0"/>
+              <a:t>Character (add double quote </a:t>
+            </a:r>
+            <a:r>
+              <a:rPr dirty="0">
                 <a:solidFill>
                   <a:schemeClr val="accent1"/>
                 </a:solidFill>
@@ -5079,10 +5117,26 @@
                 <a:ea typeface="Fira Code Retina" pitchFamily="49" charset="0"/>
                 <a:cs typeface="Fira Code Retina" pitchFamily="49" charset="0"/>
               </a:rPr>
-              <a:t>c</a:t>
-            </a:r>
-            <a:r>
-              <a:rPr lang="en-SG" sz="1800" dirty="0">
+              <a:t>"dog"</a:t>
+            </a:r>
+            <a:r>
+              <a:rPr lang="en-US" dirty="0">
+                <a:solidFill>
+                  <a:schemeClr val="accent1"/>
+                </a:solidFill>
+              </a:rPr>
+              <a:t> </a:t>
+            </a:r>
+            <a:r>
+              <a:rPr lang="en-US" dirty="0"/>
+              <a:t>(</a:t>
+            </a:r>
+            <a:r>
+              <a:rPr dirty="0"/>
+              <a:t>more common) or single quote </a:t>
+            </a:r>
+            <a:r>
+              <a:rPr dirty="0">
                 <a:solidFill>
                   <a:schemeClr val="accent1"/>
                 </a:solidFill>
@@ -5090,82 +5144,38 @@
                 <a:ea typeface="Fira Code Retina" pitchFamily="49" charset="0"/>
                 <a:cs typeface="Fira Code Retina" pitchFamily="49" charset="0"/>
               </a:rPr>
-              <a:t>("mouse", "rat", "dog", "cat")</a:t>
-            </a:r>
-          </a:p>
-          <a:p>
-            <a:pPr marL="0" indent="0">
+              <a:t>'dog'</a:t>
+            </a:r>
+            <a:r>
+              <a:rPr dirty="0">
+                <a:latin typeface="Courier"/>
+              </a:rPr>
+              <a:t>)</a:t>
+            </a:r>
+          </a:p>
+          <a:p>
+            <a:pPr lvl="1"/>
+            <a:r>
+              <a:rPr dirty="0"/>
+              <a:t>Complex</a:t>
+            </a:r>
+          </a:p>
+          <a:p>
+            <a:pPr lvl="1"/>
+            <a:r>
+              <a:rPr dirty="0"/>
+              <a:t>Raw</a:t>
+            </a:r>
+          </a:p>
+          <a:p>
+            <a:pPr marL="0" lvl="0" indent="0">
               <a:buNone/>
             </a:pPr>
-            <a:r>
-              <a:rPr lang="en-SG" sz="1800" dirty="0">
-                <a:solidFill>
-                  <a:schemeClr val="tx1"/>
-                </a:solidFill>
-                <a:latin typeface="Fira Code Retina" pitchFamily="49" charset="0"/>
-                <a:ea typeface="Fira Code Retina" pitchFamily="49" charset="0"/>
-                <a:cs typeface="Fira Code Retina" pitchFamily="49" charset="0"/>
-              </a:rPr>
-              <a:t>	                </a:t>
-            </a:r>
-            <a:r>
-              <a:rPr lang="en-SG" sz="1800" dirty="0">
-                <a:solidFill>
-                  <a:srgbClr val="FF0000"/>
-                </a:solidFill>
-                <a:latin typeface="Fira Code Retina" pitchFamily="49" charset="0"/>
-                <a:ea typeface="Fira Code Retina" pitchFamily="49" charset="0"/>
-                <a:cs typeface="Fira Code Retina" pitchFamily="49" charset="0"/>
-              </a:rPr>
-              <a:t>1       2      3      4</a:t>
-            </a:r>
-            <a:endParaRPr lang="en-US" sz="1800" dirty="0">
-              <a:solidFill>
-                <a:srgbClr val="FF0000"/>
-              </a:solidFill>
-              <a:latin typeface="Fira Code Retina" pitchFamily="49" charset="0"/>
-              <a:ea typeface="Fira Code Retina" pitchFamily="49" charset="0"/>
-              <a:cs typeface="Fira Code Retina" pitchFamily="49" charset="0"/>
-            </a:endParaRPr>
-          </a:p>
-          <a:p>
-            <a:pPr marL="457200" indent="-457200">
-              <a:buFont typeface="+mj-lt"/>
-              <a:buAutoNum type="arabicPeriod" startAt="2"/>
-            </a:pPr>
-            <a:r>
-              <a:rPr lang="en-US" dirty="0"/>
-              <a:t>Use logical vector</a:t>
-            </a:r>
-          </a:p>
-          <a:p>
-            <a:pPr lvl="1"/>
-            <a:r>
-              <a:rPr lang="en-US" dirty="0"/>
-              <a:t>Can manually define a logical vector</a:t>
-            </a:r>
-          </a:p>
-          <a:p>
-            <a:pPr lvl="1"/>
-            <a:r>
-              <a:rPr lang="en-US" dirty="0"/>
-              <a:t>More commonly, create the vector from logical tests</a:t>
-            </a:r>
-          </a:p>
-          <a:p>
-            <a:pPr marL="0" indent="0">
-              <a:buNone/>
-            </a:pPr>
-            <a:endParaRPr lang="en-US" dirty="0"/>
+            <a:endParaRPr dirty="0"/>
           </a:p>
         </p:txBody>
       </p:sp>
     </p:spTree>
-    <p:extLst>
-      <p:ext uri="{BB962C8B-B14F-4D97-AF65-F5344CB8AC3E}">
-        <p14:creationId xmlns:p14="http://schemas.microsoft.com/office/powerpoint/2010/main" val="3705624173"/>
-      </p:ext>
-    </p:extLst>
   </p:cSld>
   <p:clrMapOvr>
     <a:masterClrMapping/>
@@ -5195,7 +5205,7 @@
           <p:cNvPr id="2" name="Title 1">
             <a:extLst>
               <a:ext uri="{FF2B5EF4-FFF2-40B4-BE49-F238E27FC236}">
-                <a16:creationId xmlns:a16="http://schemas.microsoft.com/office/drawing/2014/main" id="{D5627017-214D-13FD-02A3-8F8EA17595B7}"/>
+                <a16:creationId xmlns:a16="http://schemas.microsoft.com/office/drawing/2014/main" id="{DE4178AD-BE9F-2932-FDDF-C013D6CC21FB}"/>
               </a:ext>
             </a:extLst>
           </p:cNvPr>
@@ -5212,39 +5222,57 @@
           <a:lstStyle/>
           <a:p>
             <a:r>
+              <a:rPr lang="en-SG" dirty="0"/>
+              <a:t>Vectors and data types</a:t>
+            </a:r>
+            <a:endParaRPr lang="en-US" dirty="0"/>
+          </a:p>
+        </p:txBody>
+      </p:sp>
+      <p:sp>
+        <p:nvSpPr>
+          <p:cNvPr id="3" name="Content Placeholder 2">
+            <a:extLst>
+              <a:ext uri="{FF2B5EF4-FFF2-40B4-BE49-F238E27FC236}">
+                <a16:creationId xmlns:a16="http://schemas.microsoft.com/office/drawing/2014/main" id="{5627D125-AFE7-7663-A2B9-BA3A0ADEE149}"/>
+              </a:ext>
+            </a:extLst>
+          </p:cNvPr>
+          <p:cNvSpPr>
+            <a:spLocks noGrp="1"/>
+          </p:cNvSpPr>
+          <p:nvPr>
+            <p:ph idx="1"/>
+          </p:nvPr>
+        </p:nvSpPr>
+        <p:spPr>
+          <a:xfrm>
+            <a:off x="838200" y="1825624"/>
+            <a:ext cx="10515600" cy="4552597"/>
+          </a:xfrm>
+        </p:spPr>
+        <p:txBody>
+          <a:bodyPr>
+            <a:normAutofit fontScale="92500" lnSpcReduction="20000"/>
+          </a:bodyPr>
+          <a:lstStyle/>
+          <a:p>
+            <a:r>
               <a:rPr lang="en-US" dirty="0"/>
-              <a:t>Missing data</a:t>
-            </a:r>
-          </a:p>
-        </p:txBody>
-      </p:sp>
-      <p:sp>
-        <p:nvSpPr>
-          <p:cNvPr id="3" name="Content Placeholder 2">
-            <a:extLst>
-              <a:ext uri="{FF2B5EF4-FFF2-40B4-BE49-F238E27FC236}">
-                <a16:creationId xmlns:a16="http://schemas.microsoft.com/office/drawing/2014/main" id="{F1BB47E6-15AB-E55E-B22F-3FB439FB553D}"/>
-              </a:ext>
-            </a:extLst>
-          </p:cNvPr>
-          <p:cNvSpPr>
-            <a:spLocks noGrp="1"/>
-          </p:cNvSpPr>
-          <p:nvPr>
-            <p:ph idx="1"/>
-          </p:nvPr>
-        </p:nvSpPr>
-        <p:spPr/>
-        <p:txBody>
-          <a:bodyPr/>
-          <a:lstStyle/>
-          <a:p>
+              <a:t>Functions for vectors</a:t>
+            </a:r>
+          </a:p>
+          <a:p>
+            <a:pPr lvl="1"/>
             <a:r>
               <a:rPr lang="en-US" dirty="0"/>
-              <a:t>Represented as </a:t>
-            </a:r>
-            <a:r>
-              <a:rPr lang="en-US" sz="2000" dirty="0">
+              <a:t>Attributes</a:t>
+            </a:r>
+          </a:p>
+          <a:p>
+            <a:pPr lvl="2"/>
+            <a:r>
+              <a:rPr lang="en-US" dirty="0">
                 <a:solidFill>
                   <a:schemeClr val="accent1"/>
                 </a:solidFill>
@@ -5252,24 +5280,10 @@
                 <a:ea typeface="Fira Code Retina" pitchFamily="49" charset="0"/>
                 <a:cs typeface="Fira Code Retina" pitchFamily="49" charset="0"/>
               </a:rPr>
-              <a:t>NA</a:t>
-            </a:r>
-            <a:endParaRPr lang="en-US" dirty="0">
-              <a:solidFill>
-                <a:schemeClr val="accent1"/>
-              </a:solidFill>
-              <a:latin typeface="Fira Code Retina" pitchFamily="49" charset="0"/>
-              <a:ea typeface="Fira Code Retina" pitchFamily="49" charset="0"/>
-              <a:cs typeface="Fira Code Retina" pitchFamily="49" charset="0"/>
-            </a:endParaRPr>
-          </a:p>
-          <a:p>
-            <a:r>
-              <a:rPr lang="en-US" dirty="0"/>
-              <a:t>Feeding vectors with </a:t>
-            </a:r>
-            <a:r>
-              <a:rPr lang="en-US" sz="2000" dirty="0">
+              <a:t>length(), class(), str(), </a:t>
+            </a:r>
+            <a:r>
+              <a:rPr lang="en-US" dirty="0" err="1">
                 <a:solidFill>
                   <a:schemeClr val="accent1"/>
                 </a:solidFill>
@@ -5277,110 +5291,10 @@
                 <a:ea typeface="Fira Code Retina" pitchFamily="49" charset="0"/>
                 <a:cs typeface="Fira Code Retina" pitchFamily="49" charset="0"/>
               </a:rPr>
-              <a:t>NA</a:t>
-            </a:r>
-            <a:r>
-              <a:rPr lang="en-US" dirty="0"/>
-              <a:t>s to most functions will return </a:t>
-            </a:r>
-            <a:r>
-              <a:rPr lang="en-US" sz="2000" dirty="0">
-                <a:solidFill>
-                  <a:schemeClr val="accent1"/>
-                </a:solidFill>
-                <a:latin typeface="Fira Code Retina" pitchFamily="49" charset="0"/>
-                <a:ea typeface="Fira Code Retina" pitchFamily="49" charset="0"/>
-                <a:cs typeface="Fira Code Retina" pitchFamily="49" charset="0"/>
-              </a:rPr>
-              <a:t>NA</a:t>
-            </a:r>
-            <a:r>
-              <a:rPr lang="en-US" dirty="0"/>
-              <a:t> making the user consciously remove the </a:t>
-            </a:r>
-            <a:r>
-              <a:rPr lang="en-US" sz="2000" dirty="0">
-                <a:solidFill>
-                  <a:schemeClr val="accent1"/>
-                </a:solidFill>
-                <a:latin typeface="Fira Code Retina" pitchFamily="49" charset="0"/>
-                <a:ea typeface="Fira Code Retina" pitchFamily="49" charset="0"/>
-                <a:cs typeface="Fira Code Retina" pitchFamily="49" charset="0"/>
-              </a:rPr>
-              <a:t>NA</a:t>
-            </a:r>
-            <a:r>
-              <a:rPr lang="en-US" dirty="0"/>
-              <a:t>s (by adding argument </a:t>
-            </a:r>
-            <a:r>
-              <a:rPr lang="en-US" sz="2000" dirty="0" err="1">
-                <a:solidFill>
-                  <a:schemeClr val="accent1"/>
-                </a:solidFill>
-                <a:latin typeface="Fira Code Retina" pitchFamily="49" charset="0"/>
-                <a:ea typeface="Fira Code Retina" pitchFamily="49" charset="0"/>
-                <a:cs typeface="Fira Code Retina" pitchFamily="49" charset="0"/>
-              </a:rPr>
-              <a:t>na.rm</a:t>
-            </a:r>
-            <a:r>
-              <a:rPr lang="en-US" sz="2000" dirty="0">
-                <a:solidFill>
-                  <a:schemeClr val="accent1"/>
-                </a:solidFill>
-                <a:latin typeface="Fira Code Retina" pitchFamily="49" charset="0"/>
-                <a:ea typeface="Fira Code Retina" pitchFamily="49" charset="0"/>
-                <a:cs typeface="Fira Code Retina" pitchFamily="49" charset="0"/>
-              </a:rPr>
-              <a:t> = TRUE</a:t>
-            </a:r>
-            <a:r>
-              <a:rPr lang="en-US" dirty="0"/>
-              <a:t>) in their operations.</a:t>
-            </a:r>
-          </a:p>
-          <a:p>
-            <a:r>
-              <a:rPr lang="en-US" dirty="0"/>
-              <a:t>Functions worth remembering when dealing with </a:t>
+              <a:t>typeof</a:t>
             </a:r>
             <a:r>
               <a:rPr lang="en-US" dirty="0">
-                <a:solidFill>
-                  <a:schemeClr val="accent1"/>
-                </a:solidFill>
-                <a:latin typeface="Fira Code Retina" pitchFamily="49" charset="0"/>
-                <a:ea typeface="Fira Code Retina" pitchFamily="49" charset="0"/>
-                <a:cs typeface="Fira Code Retina" pitchFamily="49" charset="0"/>
-              </a:rPr>
-              <a:t>NA</a:t>
-            </a:r>
-            <a:r>
-              <a:rPr lang="en-US" dirty="0"/>
-              <a:t>s.</a:t>
-            </a:r>
-          </a:p>
-          <a:p>
-            <a:endParaRPr lang="en-US" dirty="0"/>
-          </a:p>
-          <a:p>
-            <a:pPr marL="0" indent="0">
-              <a:buNone/>
-            </a:pPr>
-            <a:r>
-              <a:rPr lang="en-US" sz="2000" dirty="0" err="1">
-                <a:solidFill>
-                  <a:schemeClr val="accent1"/>
-                </a:solidFill>
-                <a:latin typeface="Fira Code Retina" pitchFamily="49" charset="0"/>
-                <a:ea typeface="Fira Code Retina" pitchFamily="49" charset="0"/>
-                <a:cs typeface="Fira Code Retina" pitchFamily="49" charset="0"/>
-              </a:rPr>
-              <a:t>is.na</a:t>
-            </a:r>
-            <a:r>
-              <a:rPr lang="en-US" sz="2000" dirty="0">
                 <a:solidFill>
                   <a:schemeClr val="accent1"/>
                 </a:solidFill>
@@ -5392,11 +5306,16 @@
             </a:r>
           </a:p>
           <a:p>
-            <a:pPr marL="0" indent="0">
-              <a:buNone/>
-            </a:pPr>
-            <a:r>
-              <a:rPr lang="en-US" sz="2000" dirty="0" err="1">
+            <a:pPr lvl="1"/>
+            <a:r>
+              <a:rPr lang="en-US" dirty="0">
+                <a:ea typeface="Fira Code Retina" pitchFamily="49" charset="0"/>
+                <a:cs typeface="Cambay Devanagari" pitchFamily="2" charset="77"/>
+              </a:rPr>
+              <a:t>Add more elements using </a:t>
+            </a:r>
+            <a:r>
+              <a:rPr lang="en-US" dirty="0">
                 <a:solidFill>
                   <a:schemeClr val="accent1"/>
                 </a:solidFill>
@@ -5404,10 +5323,125 @@
                 <a:ea typeface="Fira Code Retina" pitchFamily="49" charset="0"/>
                 <a:cs typeface="Fira Code Retina" pitchFamily="49" charset="0"/>
               </a:rPr>
-              <a:t>na.omit</a:t>
-            </a:r>
-            <a:r>
-              <a:rPr lang="en-US" sz="2000" dirty="0">
+              <a:t>c()</a:t>
+            </a:r>
+          </a:p>
+          <a:p>
+            <a:pPr lvl="1"/>
+            <a:r>
+              <a:rPr lang="en-US" dirty="0">
+                <a:ea typeface="Fira Code Retina" pitchFamily="49" charset="0"/>
+              </a:rPr>
+              <a:t>Manually convert variable types</a:t>
+            </a:r>
+          </a:p>
+          <a:p>
+            <a:pPr lvl="2">
+              <a:lnSpc>
+                <a:spcPct val="110000"/>
+              </a:lnSpc>
+            </a:pPr>
+            <a:r>
+              <a:rPr lang="en-US" dirty="0" err="1">
+                <a:solidFill>
+                  <a:schemeClr val="accent1"/>
+                </a:solidFill>
+                <a:latin typeface="Fira Code Retina" pitchFamily="49" charset="0"/>
+                <a:ea typeface="Fira Code Retina" pitchFamily="49" charset="0"/>
+                <a:cs typeface="Fira Code Retina" pitchFamily="49" charset="0"/>
+              </a:rPr>
+              <a:t>as.logical</a:t>
+            </a:r>
+            <a:r>
+              <a:rPr lang="en-US" dirty="0">
+                <a:solidFill>
+                  <a:schemeClr val="accent1"/>
+                </a:solidFill>
+                <a:latin typeface="Fira Code Retina" pitchFamily="49" charset="0"/>
+                <a:ea typeface="Fira Code Retina" pitchFamily="49" charset="0"/>
+                <a:cs typeface="Fira Code Retina" pitchFamily="49" charset="0"/>
+              </a:rPr>
+              <a:t>(), </a:t>
+            </a:r>
+            <a:r>
+              <a:rPr lang="en-US" dirty="0" err="1">
+                <a:solidFill>
+                  <a:schemeClr val="accent1"/>
+                </a:solidFill>
+                <a:latin typeface="Fira Code Retina" pitchFamily="49" charset="0"/>
+                <a:ea typeface="Fira Code Retina" pitchFamily="49" charset="0"/>
+                <a:cs typeface="Fira Code Retina" pitchFamily="49" charset="0"/>
+              </a:rPr>
+              <a:t>as.numeric</a:t>
+            </a:r>
+            <a:r>
+              <a:rPr lang="en-US" dirty="0">
+                <a:solidFill>
+                  <a:schemeClr val="accent1"/>
+                </a:solidFill>
+                <a:latin typeface="Fira Code Retina" pitchFamily="49" charset="0"/>
+                <a:ea typeface="Fira Code Retina" pitchFamily="49" charset="0"/>
+                <a:cs typeface="Fira Code Retina" pitchFamily="49" charset="0"/>
+              </a:rPr>
+              <a:t>(), </a:t>
+            </a:r>
+            <a:r>
+              <a:rPr lang="en-US" dirty="0" err="1">
+                <a:solidFill>
+                  <a:schemeClr val="accent1"/>
+                </a:solidFill>
+                <a:latin typeface="Fira Code Retina" pitchFamily="49" charset="0"/>
+                <a:ea typeface="Fira Code Retina" pitchFamily="49" charset="0"/>
+                <a:cs typeface="Fira Code Retina" pitchFamily="49" charset="0"/>
+              </a:rPr>
+              <a:t>as.double</a:t>
+            </a:r>
+            <a:r>
+              <a:rPr lang="en-US" dirty="0">
+                <a:solidFill>
+                  <a:schemeClr val="accent1"/>
+                </a:solidFill>
+                <a:latin typeface="Fira Code Retina" pitchFamily="49" charset="0"/>
+                <a:ea typeface="Fira Code Retina" pitchFamily="49" charset="0"/>
+                <a:cs typeface="Fira Code Retina" pitchFamily="49" charset="0"/>
+              </a:rPr>
+              <a:t>(), </a:t>
+            </a:r>
+            <a:r>
+              <a:rPr lang="en-US" dirty="0" err="1">
+                <a:solidFill>
+                  <a:schemeClr val="accent1"/>
+                </a:solidFill>
+                <a:latin typeface="Fira Code Retina" pitchFamily="49" charset="0"/>
+                <a:ea typeface="Fira Code Retina" pitchFamily="49" charset="0"/>
+                <a:cs typeface="Fira Code Retina" pitchFamily="49" charset="0"/>
+              </a:rPr>
+              <a:t>as.integer</a:t>
+            </a:r>
+            <a:r>
+              <a:rPr lang="en-US" dirty="0">
+                <a:solidFill>
+                  <a:schemeClr val="accent1"/>
+                </a:solidFill>
+                <a:latin typeface="Fira Code Retina" pitchFamily="49" charset="0"/>
+                <a:ea typeface="Fira Code Retina" pitchFamily="49" charset="0"/>
+                <a:cs typeface="Fira Code Retina" pitchFamily="49" charset="0"/>
+              </a:rPr>
+              <a:t>(), </a:t>
+            </a:r>
+            <a:r>
+              <a:rPr lang="en-US" dirty="0" err="1">
+                <a:solidFill>
+                  <a:schemeClr val="accent1"/>
+                </a:solidFill>
+                <a:latin typeface="Fira Code Retina" pitchFamily="49" charset="0"/>
+                <a:ea typeface="Fira Code Retina" pitchFamily="49" charset="0"/>
+                <a:cs typeface="Fira Code Retina" pitchFamily="49" charset="0"/>
+              </a:rPr>
+              <a:t>as.character</a:t>
+            </a:r>
+            <a:r>
+              <a:rPr lang="en-US" dirty="0">
                 <a:solidFill>
                   <a:schemeClr val="accent1"/>
                 </a:solidFill>
@@ -5419,30 +5453,70 @@
             </a:r>
           </a:p>
           <a:p>
-            <a:pPr marL="0" indent="0">
-              <a:buNone/>
-            </a:pPr>
-            <a:r>
-              <a:rPr lang="en-US" sz="2000" dirty="0" err="1">
-                <a:solidFill>
-                  <a:schemeClr val="accent1"/>
-                </a:solidFill>
-                <a:latin typeface="Fira Code Retina" pitchFamily="49" charset="0"/>
+            <a:pPr lvl="1"/>
+            <a:endParaRPr lang="en-US" dirty="0">
+              <a:latin typeface="Fira Code Retina" pitchFamily="49" charset="0"/>
+              <a:ea typeface="Fira Code Retina" pitchFamily="49" charset="0"/>
+              <a:cs typeface="Fira Code Retina" pitchFamily="49" charset="0"/>
+            </a:endParaRPr>
+          </a:p>
+          <a:p>
+            <a:r>
+              <a:rPr lang="en-US" dirty="0">
                 <a:ea typeface="Fira Code Retina" pitchFamily="49" charset="0"/>
                 <a:cs typeface="Fira Code Retina" pitchFamily="49" charset="0"/>
               </a:rPr>
-              <a:t>complete.cases</a:t>
-            </a:r>
-            <a:r>
-              <a:rPr lang="en-US" sz="2000" dirty="0">
-                <a:solidFill>
-                  <a:schemeClr val="accent1"/>
-                </a:solidFill>
-                <a:latin typeface="Fira Code Retina" pitchFamily="49" charset="0"/>
+              <a:t>Other data structures</a:t>
+            </a:r>
+          </a:p>
+          <a:p>
+            <a:pPr lvl="1"/>
+            <a:r>
+              <a:rPr lang="en-US" dirty="0">
                 <a:ea typeface="Fira Code Retina" pitchFamily="49" charset="0"/>
                 <a:cs typeface="Fira Code Retina" pitchFamily="49" charset="0"/>
               </a:rPr>
-              <a:t>()</a:t>
+              <a:t>Lists</a:t>
+            </a:r>
+          </a:p>
+          <a:p>
+            <a:pPr lvl="1"/>
+            <a:r>
+              <a:rPr lang="en-US" dirty="0">
+                <a:ea typeface="Fira Code Retina" pitchFamily="49" charset="0"/>
+                <a:cs typeface="Fira Code Retina" pitchFamily="49" charset="0"/>
+              </a:rPr>
+              <a:t>Matrices</a:t>
+            </a:r>
+          </a:p>
+          <a:p>
+            <a:pPr lvl="1"/>
+            <a:r>
+              <a:rPr lang="en-US" dirty="0">
+                <a:ea typeface="Fira Code Retina" pitchFamily="49" charset="0"/>
+                <a:cs typeface="Fira Code Retina" pitchFamily="49" charset="0"/>
+              </a:rPr>
+              <a:t>Data frames</a:t>
+            </a:r>
+          </a:p>
+          <a:p>
+            <a:pPr lvl="1"/>
+            <a:r>
+              <a:rPr lang="en-US" dirty="0">
+                <a:ea typeface="Fira Code Retina" pitchFamily="49" charset="0"/>
+                <a:cs typeface="Fira Code Retina" pitchFamily="49" charset="0"/>
+              </a:rPr>
+              <a:t>Factors</a:t>
+            </a:r>
+          </a:p>
+          <a:p>
+            <a:pPr lvl="1"/>
+            <a:r>
+              <a:rPr lang="en-US" dirty="0">
+                <a:ea typeface="Fira Code Retina" pitchFamily="49" charset="0"/>
+                <a:cs typeface="Fira Code Retina" pitchFamily="49" charset="0"/>
+              </a:rPr>
+              <a:t>Arrays</a:t>
             </a:r>
           </a:p>
         </p:txBody>
@@ -5450,7 +5524,7 @@
     </p:spTree>
     <p:extLst>
       <p:ext uri="{BB962C8B-B14F-4D97-AF65-F5344CB8AC3E}">
-        <p14:creationId xmlns:p14="http://schemas.microsoft.com/office/powerpoint/2010/main" val="629535913"/>
+        <p14:creationId xmlns:p14="http://schemas.microsoft.com/office/powerpoint/2010/main" val="287049191"/>
       </p:ext>
     </p:extLst>
   </p:cSld>
@@ -5482,7 +5556,7 @@
           <p:cNvPr id="2" name="Title 1">
             <a:extLst>
               <a:ext uri="{FF2B5EF4-FFF2-40B4-BE49-F238E27FC236}">
-                <a16:creationId xmlns:a16="http://schemas.microsoft.com/office/drawing/2014/main" id="{BE593171-0718-B5EE-C8FF-319E5802D154}"/>
+                <a16:creationId xmlns:a16="http://schemas.microsoft.com/office/drawing/2014/main" id="{E90CCBB2-BDA4-161D-FC5F-5E57177B4C84}"/>
               </a:ext>
             </a:extLst>
           </p:cNvPr>
@@ -5499,49 +5573,188 @@
           <a:lstStyle/>
           <a:p>
             <a:r>
+              <a:rPr lang="en-US" dirty="0" err="1"/>
+              <a:t>Subsetting</a:t>
+            </a:r>
+            <a:r>
               <a:rPr lang="en-US" dirty="0"/>
-              <a:t>RStudio Projects (.</a:t>
-            </a:r>
-            <a:r>
-              <a:rPr lang="en-US" dirty="0" err="1"/>
-              <a:t>Rproj</a:t>
-            </a:r>
+              <a:t> vectors</a:t>
+            </a:r>
+          </a:p>
+        </p:txBody>
+      </p:sp>
+      <p:sp>
+        <p:nvSpPr>
+          <p:cNvPr id="3" name="Content Placeholder 2">
+            <a:extLst>
+              <a:ext uri="{FF2B5EF4-FFF2-40B4-BE49-F238E27FC236}">
+                <a16:creationId xmlns:a16="http://schemas.microsoft.com/office/drawing/2014/main" id="{7024D2EB-95B2-A304-6CE0-6F7B02FA3E0E}"/>
+              </a:ext>
+            </a:extLst>
+          </p:cNvPr>
+          <p:cNvSpPr>
+            <a:spLocks noGrp="1"/>
+          </p:cNvSpPr>
+          <p:nvPr>
+            <p:ph idx="1"/>
+          </p:nvPr>
+        </p:nvSpPr>
+        <p:spPr/>
+        <p:txBody>
+          <a:bodyPr/>
+          <a:lstStyle/>
+          <a:p>
             <a:r>
               <a:rPr lang="en-US" dirty="0"/>
-              <a:t>)</a:t>
-            </a:r>
-          </a:p>
-        </p:txBody>
-      </p:sp>
-      <p:sp>
-        <p:nvSpPr>
-          <p:cNvPr id="3" name="Text Placeholder 2">
-            <a:extLst>
-              <a:ext uri="{FF2B5EF4-FFF2-40B4-BE49-F238E27FC236}">
-                <a16:creationId xmlns:a16="http://schemas.microsoft.com/office/drawing/2014/main" id="{624648FB-778C-52DD-EC79-0A94BAF6CD6D}"/>
-              </a:ext>
-            </a:extLst>
-          </p:cNvPr>
-          <p:cNvSpPr>
-            <a:spLocks noGrp="1"/>
-          </p:cNvSpPr>
-          <p:nvPr>
-            <p:ph type="body" idx="1"/>
-          </p:nvPr>
-        </p:nvSpPr>
-        <p:spPr/>
-        <p:txBody>
-          <a:bodyPr/>
-          <a:lstStyle/>
-          <a:p>
-            <a:endParaRPr lang="en-US"/>
+              <a:t>It means extracting elements and use them create a new vector</a:t>
+            </a:r>
+          </a:p>
+          <a:p>
+            <a:r>
+              <a:rPr lang="en-US" dirty="0"/>
+              <a:t>Two ways to subset a vector</a:t>
+            </a:r>
+          </a:p>
+          <a:p>
+            <a:endParaRPr lang="en-US" dirty="0"/>
+          </a:p>
+          <a:p>
+            <a:pPr marL="457200" indent="-457200">
+              <a:buFont typeface="+mj-lt"/>
+              <a:buAutoNum type="arabicPeriod"/>
+            </a:pPr>
+            <a:r>
+              <a:rPr lang="en-US" dirty="0"/>
+              <a:t>Use indices: sequence of elements in a vector</a:t>
+            </a:r>
+          </a:p>
+          <a:p>
+            <a:pPr lvl="1"/>
+            <a:r>
+              <a:rPr lang="en-US" dirty="0"/>
+              <a:t>Indices always start at 1</a:t>
+            </a:r>
+          </a:p>
+          <a:p>
+            <a:pPr marL="0" indent="0">
+              <a:buNone/>
+            </a:pPr>
+            <a:r>
+              <a:rPr lang="en-SG" sz="1800" dirty="0">
+                <a:solidFill>
+                  <a:schemeClr val="tx1"/>
+                </a:solidFill>
+                <a:latin typeface="Fira Code Retina" pitchFamily="49" charset="0"/>
+                <a:ea typeface="Fira Code Retina" pitchFamily="49" charset="0"/>
+                <a:cs typeface="Fira Code Retina" pitchFamily="49" charset="0"/>
+              </a:rPr>
+              <a:t>	</a:t>
+            </a:r>
+            <a:r>
+              <a:rPr lang="en-SG" sz="1800" dirty="0">
+                <a:solidFill>
+                  <a:schemeClr val="accent1"/>
+                </a:solidFill>
+                <a:latin typeface="Fira Code Retina" pitchFamily="49" charset="0"/>
+                <a:ea typeface="Fira Code Retina" pitchFamily="49" charset="0"/>
+                <a:cs typeface="Fira Code Retina" pitchFamily="49" charset="0"/>
+              </a:rPr>
+              <a:t>animals &lt;- </a:t>
+            </a:r>
+            <a:r>
+              <a:rPr lang="en-SG" sz="1800" b="1" dirty="0">
+                <a:solidFill>
+                  <a:schemeClr val="accent1"/>
+                </a:solidFill>
+                <a:latin typeface="Fira Code Retina" pitchFamily="49" charset="0"/>
+                <a:ea typeface="Fira Code Retina" pitchFamily="49" charset="0"/>
+                <a:cs typeface="Fira Code Retina" pitchFamily="49" charset="0"/>
+              </a:rPr>
+              <a:t>c</a:t>
+            </a:r>
+            <a:r>
+              <a:rPr lang="en-SG" sz="1800" dirty="0">
+                <a:solidFill>
+                  <a:schemeClr val="accent1"/>
+                </a:solidFill>
+                <a:latin typeface="Fira Code Retina" pitchFamily="49" charset="0"/>
+                <a:ea typeface="Fira Code Retina" pitchFamily="49" charset="0"/>
+                <a:cs typeface="Fira Code Retina" pitchFamily="49" charset="0"/>
+              </a:rPr>
+              <a:t>("mouse", "rat", "dog", "cat")</a:t>
+            </a:r>
+          </a:p>
+          <a:p>
+            <a:pPr marL="0" indent="0">
+              <a:buNone/>
+            </a:pPr>
+            <a:r>
+              <a:rPr lang="en-SG" sz="1800" dirty="0">
+                <a:solidFill>
+                  <a:schemeClr val="tx1"/>
+                </a:solidFill>
+                <a:latin typeface="Fira Code Retina" pitchFamily="49" charset="0"/>
+                <a:ea typeface="Fira Code Retina" pitchFamily="49" charset="0"/>
+                <a:cs typeface="Fira Code Retina" pitchFamily="49" charset="0"/>
+              </a:rPr>
+              <a:t>	                </a:t>
+            </a:r>
+            <a:r>
+              <a:rPr lang="en-SG" sz="1800" dirty="0">
+                <a:solidFill>
+                  <a:srgbClr val="FF0000"/>
+                </a:solidFill>
+                <a:latin typeface="Fira Code Retina" pitchFamily="49" charset="0"/>
+                <a:ea typeface="Fira Code Retina" pitchFamily="49" charset="0"/>
+                <a:cs typeface="Fira Code Retina" pitchFamily="49" charset="0"/>
+              </a:rPr>
+              <a:t>1       2      3      4</a:t>
+            </a:r>
+            <a:endParaRPr lang="en-US" sz="1800" dirty="0">
+              <a:solidFill>
+                <a:srgbClr val="FF0000"/>
+              </a:solidFill>
+              <a:latin typeface="Fira Code Retina" pitchFamily="49" charset="0"/>
+              <a:ea typeface="Fira Code Retina" pitchFamily="49" charset="0"/>
+              <a:cs typeface="Fira Code Retina" pitchFamily="49" charset="0"/>
+            </a:endParaRPr>
+          </a:p>
+          <a:p>
+            <a:pPr marL="457200" indent="-457200">
+              <a:buFont typeface="+mj-lt"/>
+              <a:buAutoNum type="arabicPeriod" startAt="2"/>
+            </a:pPr>
+            <a:r>
+              <a:rPr lang="en-US" dirty="0"/>
+              <a:t>Use logical vector</a:t>
+            </a:r>
+          </a:p>
+          <a:p>
+            <a:pPr lvl="1"/>
+            <a:r>
+              <a:rPr lang="en-US" dirty="0"/>
+              <a:t>Can manually define a logical vector</a:t>
+            </a:r>
+          </a:p>
+          <a:p>
+            <a:pPr lvl="1"/>
+            <a:r>
+              <a:rPr lang="en-US" dirty="0"/>
+              <a:t>More commonly, create the vector from logical tests</a:t>
+            </a:r>
+          </a:p>
+          <a:p>
+            <a:pPr marL="0" indent="0">
+              <a:buNone/>
+            </a:pPr>
+            <a:endParaRPr lang="en-US" dirty="0"/>
           </a:p>
         </p:txBody>
       </p:sp>
     </p:spTree>
     <p:extLst>
       <p:ext uri="{BB962C8B-B14F-4D97-AF65-F5344CB8AC3E}">
-        <p14:creationId xmlns:p14="http://schemas.microsoft.com/office/powerpoint/2010/main" val="3891912751"/>
+        <p14:creationId xmlns:p14="http://schemas.microsoft.com/office/powerpoint/2010/main" val="3705624173"/>
       </p:ext>
     </p:extLst>
   </p:cSld>
@@ -5573,7 +5786,7 @@
           <p:cNvPr id="2" name="Title 1">
             <a:extLst>
               <a:ext uri="{FF2B5EF4-FFF2-40B4-BE49-F238E27FC236}">
-                <a16:creationId xmlns:a16="http://schemas.microsoft.com/office/drawing/2014/main" id="{1200E9C6-183A-5383-6429-99111E295EAE}"/>
+                <a16:creationId xmlns:a16="http://schemas.microsoft.com/office/drawing/2014/main" id="{D5627017-214D-13FD-02A3-8F8EA17595B7}"/>
               </a:ext>
             </a:extLst>
           </p:cNvPr>
@@ -5591,7 +5804,7 @@
           <a:p>
             <a:r>
               <a:rPr lang="en-US" dirty="0"/>
-              <a:t>RStudio Projects</a:t>
+              <a:t>Missing data</a:t>
             </a:r>
           </a:p>
         </p:txBody>
@@ -5601,7 +5814,7 @@
           <p:cNvPr id="3" name="Content Placeholder 2">
             <a:extLst>
               <a:ext uri="{FF2B5EF4-FFF2-40B4-BE49-F238E27FC236}">
-                <a16:creationId xmlns:a16="http://schemas.microsoft.com/office/drawing/2014/main" id="{CFA10AFA-8450-7217-4B05-C240BBBB9BE4}"/>
+                <a16:creationId xmlns:a16="http://schemas.microsoft.com/office/drawing/2014/main" id="{F1BB47E6-15AB-E55E-B22F-3FB439FB553D}"/>
               </a:ext>
             </a:extLst>
           </p:cNvPr>
@@ -5619,49 +5832,216 @@
           <a:p>
             <a:r>
               <a:rPr lang="en-US" dirty="0"/>
-              <a:t>Project root folder – look for .</a:t>
-            </a:r>
-            <a:r>
-              <a:rPr lang="en-US" dirty="0" err="1"/>
-              <a:t>rproj</a:t>
-            </a:r>
+              <a:t>Represented as </a:t>
+            </a:r>
+            <a:r>
+              <a:rPr lang="en-US" sz="2000" dirty="0">
+                <a:solidFill>
+                  <a:schemeClr val="accent1"/>
+                </a:solidFill>
+                <a:latin typeface="Fira Code Retina" pitchFamily="49" charset="0"/>
+                <a:ea typeface="Fira Code Retina" pitchFamily="49" charset="0"/>
+                <a:cs typeface="Fira Code Retina" pitchFamily="49" charset="0"/>
+              </a:rPr>
+              <a:t>NA</a:t>
+            </a:r>
+            <a:endParaRPr lang="en-US" dirty="0">
+              <a:solidFill>
+                <a:schemeClr val="accent1"/>
+              </a:solidFill>
+              <a:latin typeface="Fira Code Retina" pitchFamily="49" charset="0"/>
+              <a:ea typeface="Fira Code Retina" pitchFamily="49" charset="0"/>
+              <a:cs typeface="Fira Code Retina" pitchFamily="49" charset="0"/>
+            </a:endParaRPr>
+          </a:p>
+          <a:p>
             <a:r>
               <a:rPr lang="en-US" dirty="0"/>
-              <a:t> file</a:t>
-            </a:r>
-          </a:p>
-          <a:p>
+              <a:t>Feeding vectors with </a:t>
+            </a:r>
+            <a:r>
+              <a:rPr lang="en-US" sz="2000" dirty="0">
+                <a:solidFill>
+                  <a:schemeClr val="accent1"/>
+                </a:solidFill>
+                <a:latin typeface="Fira Code Retina" pitchFamily="49" charset="0"/>
+                <a:ea typeface="Fira Code Retina" pitchFamily="49" charset="0"/>
+                <a:cs typeface="Fira Code Retina" pitchFamily="49" charset="0"/>
+              </a:rPr>
+              <a:t>NA</a:t>
+            </a:r>
             <a:r>
               <a:rPr lang="en-US" dirty="0"/>
-              <a:t>Advantages</a:t>
-            </a:r>
-          </a:p>
-          <a:p>
-            <a:pPr lvl="1"/>
+              <a:t>s to most functions will return </a:t>
+            </a:r>
+            <a:r>
+              <a:rPr lang="en-US" sz="2000" dirty="0">
+                <a:solidFill>
+                  <a:schemeClr val="accent1"/>
+                </a:solidFill>
+                <a:latin typeface="Fira Code Retina" pitchFamily="49" charset="0"/>
+                <a:ea typeface="Fira Code Retina" pitchFamily="49" charset="0"/>
+                <a:cs typeface="Fira Code Retina" pitchFamily="49" charset="0"/>
+              </a:rPr>
+              <a:t>NA</a:t>
+            </a:r>
             <a:r>
               <a:rPr lang="en-US" dirty="0"/>
-              <a:t>Relative paths: Project folder is portable and the code just works on any computer</a:t>
-            </a:r>
-          </a:p>
-          <a:p>
-            <a:pPr lvl="1"/>
+              <a:t> making the user consciously remove the </a:t>
+            </a:r>
+            <a:r>
+              <a:rPr lang="en-US" sz="2000" dirty="0">
+                <a:solidFill>
+                  <a:schemeClr val="accent1"/>
+                </a:solidFill>
+                <a:latin typeface="Fira Code Retina" pitchFamily="49" charset="0"/>
+                <a:ea typeface="Fira Code Retina" pitchFamily="49" charset="0"/>
+                <a:cs typeface="Fira Code Retina" pitchFamily="49" charset="0"/>
+              </a:rPr>
+              <a:t>NA</a:t>
+            </a:r>
             <a:r>
               <a:rPr lang="en-US" dirty="0"/>
-              <a:t>Ability to configure project-specific setting without modifying global settings</a:t>
+              <a:t>s (by adding argument </a:t>
+            </a:r>
+            <a:r>
+              <a:rPr lang="en-US" sz="2000" dirty="0" err="1">
+                <a:solidFill>
+                  <a:schemeClr val="accent1"/>
+                </a:solidFill>
+                <a:latin typeface="Fira Code Retina" pitchFamily="49" charset="0"/>
+                <a:ea typeface="Fira Code Retina" pitchFamily="49" charset="0"/>
+                <a:cs typeface="Fira Code Retina" pitchFamily="49" charset="0"/>
+              </a:rPr>
+              <a:t>na.rm</a:t>
+            </a:r>
+            <a:r>
+              <a:rPr lang="en-US" sz="2000" dirty="0">
+                <a:solidFill>
+                  <a:schemeClr val="accent1"/>
+                </a:solidFill>
+                <a:latin typeface="Fira Code Retina" pitchFamily="49" charset="0"/>
+                <a:ea typeface="Fira Code Retina" pitchFamily="49" charset="0"/>
+                <a:cs typeface="Fira Code Retina" pitchFamily="49" charset="0"/>
+              </a:rPr>
+              <a:t> = TRUE</a:t>
+            </a:r>
+            <a:r>
+              <a:rPr lang="en-US" dirty="0"/>
+              <a:t>) in their operations.</a:t>
+            </a:r>
+          </a:p>
+          <a:p>
+            <a:r>
+              <a:rPr lang="en-US" dirty="0"/>
+              <a:t>Functions worth remembering when dealing with </a:t>
+            </a:r>
+            <a:r>
+              <a:rPr lang="en-US" dirty="0">
+                <a:solidFill>
+                  <a:schemeClr val="accent1"/>
+                </a:solidFill>
+                <a:latin typeface="Fira Code Retina" pitchFamily="49" charset="0"/>
+                <a:ea typeface="Fira Code Retina" pitchFamily="49" charset="0"/>
+                <a:cs typeface="Fira Code Retina" pitchFamily="49" charset="0"/>
+              </a:rPr>
+              <a:t>NA</a:t>
+            </a:r>
+            <a:r>
+              <a:rPr lang="en-US" dirty="0"/>
+              <a:t>s.</a:t>
             </a:r>
           </a:p>
           <a:p>
             <a:endParaRPr lang="en-US" dirty="0"/>
           </a:p>
           <a:p>
-            <a:endParaRPr lang="en-US" dirty="0"/>
+            <a:pPr marL="0" indent="0">
+              <a:buNone/>
+            </a:pPr>
+            <a:r>
+              <a:rPr lang="en-US" sz="2000" dirty="0" err="1">
+                <a:solidFill>
+                  <a:schemeClr val="accent1"/>
+                </a:solidFill>
+                <a:latin typeface="Fira Code Retina" pitchFamily="49" charset="0"/>
+                <a:ea typeface="Fira Code Retina" pitchFamily="49" charset="0"/>
+                <a:cs typeface="Fira Code Retina" pitchFamily="49" charset="0"/>
+              </a:rPr>
+              <a:t>is.na</a:t>
+            </a:r>
+            <a:r>
+              <a:rPr lang="en-US" sz="2000" dirty="0">
+                <a:solidFill>
+                  <a:schemeClr val="accent1"/>
+                </a:solidFill>
+                <a:latin typeface="Fira Code Retina" pitchFamily="49" charset="0"/>
+                <a:ea typeface="Fira Code Retina" pitchFamily="49" charset="0"/>
+                <a:cs typeface="Fira Code Retina" pitchFamily="49" charset="0"/>
+              </a:rPr>
+              <a:t>()</a:t>
+            </a:r>
+          </a:p>
+          <a:p>
+            <a:pPr marL="0" indent="0">
+              <a:buNone/>
+            </a:pPr>
+            <a:r>
+              <a:rPr lang="en-US" sz="2000" dirty="0" err="1">
+                <a:solidFill>
+                  <a:schemeClr val="accent1"/>
+                </a:solidFill>
+                <a:latin typeface="Fira Code Retina" pitchFamily="49" charset="0"/>
+                <a:ea typeface="Fira Code Retina" pitchFamily="49" charset="0"/>
+                <a:cs typeface="Fira Code Retina" pitchFamily="49" charset="0"/>
+              </a:rPr>
+              <a:t>na.omit</a:t>
+            </a:r>
+            <a:r>
+              <a:rPr lang="en-US" sz="2000" dirty="0">
+                <a:solidFill>
+                  <a:schemeClr val="accent1"/>
+                </a:solidFill>
+                <a:latin typeface="Fira Code Retina" pitchFamily="49" charset="0"/>
+                <a:ea typeface="Fira Code Retina" pitchFamily="49" charset="0"/>
+                <a:cs typeface="Fira Code Retina" pitchFamily="49" charset="0"/>
+              </a:rPr>
+              <a:t>()</a:t>
+            </a:r>
+          </a:p>
+          <a:p>
+            <a:pPr marL="0" indent="0">
+              <a:buNone/>
+            </a:pPr>
+            <a:r>
+              <a:rPr lang="en-US" sz="2000" dirty="0" err="1">
+                <a:solidFill>
+                  <a:schemeClr val="accent1"/>
+                </a:solidFill>
+                <a:latin typeface="Fira Code Retina" pitchFamily="49" charset="0"/>
+                <a:ea typeface="Fira Code Retina" pitchFamily="49" charset="0"/>
+                <a:cs typeface="Fira Code Retina" pitchFamily="49" charset="0"/>
+              </a:rPr>
+              <a:t>complete.cases</a:t>
+            </a:r>
+            <a:r>
+              <a:rPr lang="en-US" sz="2000" dirty="0">
+                <a:solidFill>
+                  <a:schemeClr val="accent1"/>
+                </a:solidFill>
+                <a:latin typeface="Fira Code Retina" pitchFamily="49" charset="0"/>
+                <a:ea typeface="Fira Code Retina" pitchFamily="49" charset="0"/>
+                <a:cs typeface="Fira Code Retina" pitchFamily="49" charset="0"/>
+              </a:rPr>
+              <a:t>()</a:t>
+            </a:r>
           </a:p>
         </p:txBody>
       </p:sp>
     </p:spTree>
     <p:extLst>
       <p:ext uri="{BB962C8B-B14F-4D97-AF65-F5344CB8AC3E}">
-        <p14:creationId xmlns:p14="http://schemas.microsoft.com/office/powerpoint/2010/main" val="3229189987"/>
+        <p14:creationId xmlns:p14="http://schemas.microsoft.com/office/powerpoint/2010/main" val="629535913"/>
       </p:ext>
     </p:extLst>
   </p:cSld>

</xml_diff>